<commit_message>
Fix typos and add PSR slide
</commit_message>
<xml_diff>
--- a/php_v0.1.pptx
+++ b/php_v0.1.pptx
@@ -5,10 +5,10 @@
     <p:sldMasterId id="2147483648" r:id="rId5"/>
   </p:sldMasterIdLst>
   <p:notesMasterIdLst>
-    <p:notesMasterId r:id="rId44"/>
+    <p:notesMasterId r:id="rId46"/>
   </p:notesMasterIdLst>
   <p:handoutMasterIdLst>
-    <p:handoutMasterId r:id="rId45"/>
+    <p:handoutMasterId r:id="rId47"/>
   </p:handoutMasterIdLst>
   <p:sldIdLst>
     <p:sldId id="784" r:id="rId6"/>
@@ -38,17 +38,19 @@
     <p:sldId id="981" r:id="rId30"/>
     <p:sldId id="984" r:id="rId31"/>
     <p:sldId id="996" r:id="rId32"/>
-    <p:sldId id="982" r:id="rId33"/>
-    <p:sldId id="986" r:id="rId34"/>
-    <p:sldId id="987" r:id="rId35"/>
-    <p:sldId id="988" r:id="rId36"/>
-    <p:sldId id="989" r:id="rId37"/>
-    <p:sldId id="990" r:id="rId38"/>
-    <p:sldId id="991" r:id="rId39"/>
-    <p:sldId id="992" r:id="rId40"/>
-    <p:sldId id="993" r:id="rId41"/>
-    <p:sldId id="994" r:id="rId42"/>
-    <p:sldId id="995" r:id="rId43"/>
+    <p:sldId id="997" r:id="rId33"/>
+    <p:sldId id="982" r:id="rId34"/>
+    <p:sldId id="986" r:id="rId35"/>
+    <p:sldId id="987" r:id="rId36"/>
+    <p:sldId id="988" r:id="rId37"/>
+    <p:sldId id="989" r:id="rId38"/>
+    <p:sldId id="990" r:id="rId39"/>
+    <p:sldId id="998" r:id="rId40"/>
+    <p:sldId id="991" r:id="rId41"/>
+    <p:sldId id="992" r:id="rId42"/>
+    <p:sldId id="993" r:id="rId43"/>
+    <p:sldId id="994" r:id="rId44"/>
+    <p:sldId id="995" r:id="rId45"/>
   </p:sldIdLst>
   <p:sldSz cx="12192000" cy="6858000"/>
   <p:notesSz cx="6858000" cy="9144000"/>
@@ -179,12 +181,14 @@
             <p14:sldId id="981"/>
             <p14:sldId id="984"/>
             <p14:sldId id="996"/>
+            <p14:sldId id="997"/>
             <p14:sldId id="982"/>
             <p14:sldId id="986"/>
             <p14:sldId id="987"/>
             <p14:sldId id="988"/>
             <p14:sldId id="989"/>
             <p14:sldId id="990"/>
+            <p14:sldId id="998"/>
             <p14:sldId id="991"/>
             <p14:sldId id="992"/>
             <p14:sldId id="993"/>
@@ -309,7 +313,7 @@
             <a:fld id="{7355ED02-278B-4EDB-9E99-352CF5837F37}" type="datetimeFigureOut">
               <a:rPr lang="fr-FR" smtClean="0"/>
               <a:pPr/>
-              <a:t>08/03/2020</a:t>
+              <a:t>09/03/2020</a:t>
             </a:fld>
             <a:endParaRPr lang="fr-FR"/>
           </a:p>
@@ -476,7 +480,7 @@
             <a:fld id="{344847AB-3B75-FF4A-B0A2-6BEB5C2F7506}" type="datetimeFigureOut">
               <a:rPr lang="en-US" smtClean="0"/>
               <a:pPr/>
-              <a:t>3/8/2020</a:t>
+              <a:t>3/9/2020</a:t>
             </a:fld>
             <a:endParaRPr lang="en-US"/>
           </a:p>
@@ -2391,14 +2395,18 @@
           <a:bodyPr lIns="89715" tIns="44856" rIns="89715" bIns="44856"/>
           <a:lstStyle/>
           <a:p>
-            <a:endParaRPr lang="en-CA" sz="1000" dirty="0"/>
+            <a:pPr marL="0" indent="0">
+              <a:buFont typeface="Arial" pitchFamily="34" charset="0"/>
+              <a:buNone/>
+            </a:pPr>
+            <a:endParaRPr lang="en-CA" sz="1000" b="1" dirty="0"/>
           </a:p>
         </p:txBody>
       </p:sp>
     </p:spTree>
     <p:extLst>
       <p:ext uri="{BB962C8B-B14F-4D97-AF65-F5344CB8AC3E}">
-        <p14:creationId xmlns:p14="http://schemas.microsoft.com/office/powerpoint/2010/main" val="2435633866"/>
+        <p14:creationId xmlns:p14="http://schemas.microsoft.com/office/powerpoint/2010/main" val="3862503820"/>
       </p:ext>
     </p:extLst>
   </p:cSld>
@@ -2481,7 +2489,7 @@
     </p:spTree>
     <p:extLst>
       <p:ext uri="{BB962C8B-B14F-4D97-AF65-F5344CB8AC3E}">
-        <p14:creationId xmlns:p14="http://schemas.microsoft.com/office/powerpoint/2010/main" val="1287637891"/>
+        <p14:creationId xmlns:p14="http://schemas.microsoft.com/office/powerpoint/2010/main" val="2435633866"/>
       </p:ext>
     </p:extLst>
   </p:cSld>
@@ -2564,7 +2572,7 @@
     </p:spTree>
     <p:extLst>
       <p:ext uri="{BB962C8B-B14F-4D97-AF65-F5344CB8AC3E}">
-        <p14:creationId xmlns:p14="http://schemas.microsoft.com/office/powerpoint/2010/main" val="247217238"/>
+        <p14:creationId xmlns:p14="http://schemas.microsoft.com/office/powerpoint/2010/main" val="1287637891"/>
       </p:ext>
     </p:extLst>
   </p:cSld>
@@ -2730,7 +2738,7 @@
     </p:spTree>
     <p:extLst>
       <p:ext uri="{BB962C8B-B14F-4D97-AF65-F5344CB8AC3E}">
-        <p14:creationId xmlns:p14="http://schemas.microsoft.com/office/powerpoint/2010/main" val="1659781849"/>
+        <p14:creationId xmlns:p14="http://schemas.microsoft.com/office/powerpoint/2010/main" val="247217238"/>
       </p:ext>
     </p:extLst>
   </p:cSld>
@@ -2813,7 +2821,7 @@
     </p:spTree>
     <p:extLst>
       <p:ext uri="{BB962C8B-B14F-4D97-AF65-F5344CB8AC3E}">
-        <p14:creationId xmlns:p14="http://schemas.microsoft.com/office/powerpoint/2010/main" val="3355102556"/>
+        <p14:creationId xmlns:p14="http://schemas.microsoft.com/office/powerpoint/2010/main" val="1659781849"/>
       </p:ext>
     </p:extLst>
   </p:cSld>
@@ -2896,7 +2904,7 @@
     </p:spTree>
     <p:extLst>
       <p:ext uri="{BB962C8B-B14F-4D97-AF65-F5344CB8AC3E}">
-        <p14:creationId xmlns:p14="http://schemas.microsoft.com/office/powerpoint/2010/main" val="1804042905"/>
+        <p14:creationId xmlns:p14="http://schemas.microsoft.com/office/powerpoint/2010/main" val="3355102556"/>
       </p:ext>
     </p:extLst>
   </p:cSld>
@@ -2979,7 +2987,7 @@
     </p:spTree>
     <p:extLst>
       <p:ext uri="{BB962C8B-B14F-4D97-AF65-F5344CB8AC3E}">
-        <p14:creationId xmlns:p14="http://schemas.microsoft.com/office/powerpoint/2010/main" val="427902654"/>
+        <p14:creationId xmlns:p14="http://schemas.microsoft.com/office/powerpoint/2010/main" val="1804042905"/>
       </p:ext>
     </p:extLst>
   </p:cSld>
@@ -3062,7 +3070,7 @@
     </p:spTree>
     <p:extLst>
       <p:ext uri="{BB962C8B-B14F-4D97-AF65-F5344CB8AC3E}">
-        <p14:creationId xmlns:p14="http://schemas.microsoft.com/office/powerpoint/2010/main" val="1721378966"/>
+        <p14:creationId xmlns:p14="http://schemas.microsoft.com/office/powerpoint/2010/main" val="656274326"/>
       </p:ext>
     </p:extLst>
   </p:cSld>
@@ -3145,7 +3153,7 @@
     </p:spTree>
     <p:extLst>
       <p:ext uri="{BB962C8B-B14F-4D97-AF65-F5344CB8AC3E}">
-        <p14:creationId xmlns:p14="http://schemas.microsoft.com/office/powerpoint/2010/main" val="3375340588"/>
+        <p14:creationId xmlns:p14="http://schemas.microsoft.com/office/powerpoint/2010/main" val="427902654"/>
       </p:ext>
     </p:extLst>
   </p:cSld>
@@ -3228,6 +3236,172 @@
     </p:spTree>
     <p:extLst>
       <p:ext uri="{BB962C8B-B14F-4D97-AF65-F5344CB8AC3E}">
+        <p14:creationId xmlns:p14="http://schemas.microsoft.com/office/powerpoint/2010/main" val="1721378966"/>
+      </p:ext>
+    </p:extLst>
+  </p:cSld>
+  <p:clrMapOvr>
+    <a:masterClrMapping/>
+  </p:clrMapOvr>
+</p:notes>
+</file>
+
+<file path=ppt/notesSlides/notesSlide37.xml><?xml version="1.0" encoding="utf-8"?>
+<p:notes xmlns:a="http://schemas.openxmlformats.org/drawingml/2006/main" xmlns:r="http://schemas.openxmlformats.org/officeDocument/2006/relationships" xmlns:p="http://schemas.openxmlformats.org/presentationml/2006/main">
+  <p:cSld>
+    <p:spTree>
+      <p:nvGrpSpPr>
+        <p:cNvPr id="1" name=""/>
+        <p:cNvGrpSpPr/>
+        <p:nvPr/>
+      </p:nvGrpSpPr>
+      <p:grpSpPr>
+        <a:xfrm>
+          <a:off x="0" y="0"/>
+          <a:ext cx="0" cy="0"/>
+          <a:chOff x="0" y="0"/>
+          <a:chExt cx="0" cy="0"/>
+        </a:xfrm>
+      </p:grpSpPr>
+      <p:sp>
+        <p:nvSpPr>
+          <p:cNvPr id="48130" name="Rectangle 1026"/>
+          <p:cNvSpPr>
+            <a:spLocks noGrp="1" noRot="1" noChangeAspect="1" noChangeArrowheads="1" noTextEdit="1"/>
+          </p:cNvSpPr>
+          <p:nvPr>
+            <p:ph type="sldImg"/>
+          </p:nvPr>
+        </p:nvSpPr>
+        <p:spPr>
+          <a:xfrm>
+            <a:off x="381000" y="685800"/>
+            <a:ext cx="6096000" cy="3429000"/>
+          </a:xfrm>
+          <a:solidFill>
+            <a:srgbClr val="FFFFFF"/>
+          </a:solidFill>
+          <a:ln/>
+        </p:spPr>
+      </p:sp>
+      <p:sp>
+        <p:nvSpPr>
+          <p:cNvPr id="48131" name="Rectangle 1027"/>
+          <p:cNvSpPr>
+            <a:spLocks noGrp="1" noChangeArrowheads="1"/>
+          </p:cNvSpPr>
+          <p:nvPr>
+            <p:ph type="body" idx="1"/>
+          </p:nvPr>
+        </p:nvSpPr>
+        <p:spPr>
+          <a:xfrm>
+            <a:off x="686421" y="4342467"/>
+            <a:ext cx="5485158" cy="4116049"/>
+          </a:xfrm>
+          <a:solidFill>
+            <a:srgbClr val="FFFFFF"/>
+          </a:solidFill>
+          <a:ln>
+            <a:solidFill>
+              <a:srgbClr val="000000"/>
+            </a:solidFill>
+          </a:ln>
+        </p:spPr>
+        <p:txBody>
+          <a:bodyPr lIns="89715" tIns="44856" rIns="89715" bIns="44856"/>
+          <a:lstStyle/>
+          <a:p>
+            <a:endParaRPr lang="en-CA" sz="1000" dirty="0"/>
+          </a:p>
+        </p:txBody>
+      </p:sp>
+    </p:spTree>
+    <p:extLst>
+      <p:ext uri="{BB962C8B-B14F-4D97-AF65-F5344CB8AC3E}">
+        <p14:creationId xmlns:p14="http://schemas.microsoft.com/office/powerpoint/2010/main" val="3375340588"/>
+      </p:ext>
+    </p:extLst>
+  </p:cSld>
+  <p:clrMapOvr>
+    <a:masterClrMapping/>
+  </p:clrMapOvr>
+</p:notes>
+</file>
+
+<file path=ppt/notesSlides/notesSlide38.xml><?xml version="1.0" encoding="utf-8"?>
+<p:notes xmlns:a="http://schemas.openxmlformats.org/drawingml/2006/main" xmlns:r="http://schemas.openxmlformats.org/officeDocument/2006/relationships" xmlns:p="http://schemas.openxmlformats.org/presentationml/2006/main">
+  <p:cSld>
+    <p:spTree>
+      <p:nvGrpSpPr>
+        <p:cNvPr id="1" name=""/>
+        <p:cNvGrpSpPr/>
+        <p:nvPr/>
+      </p:nvGrpSpPr>
+      <p:grpSpPr>
+        <a:xfrm>
+          <a:off x="0" y="0"/>
+          <a:ext cx="0" cy="0"/>
+          <a:chOff x="0" y="0"/>
+          <a:chExt cx="0" cy="0"/>
+        </a:xfrm>
+      </p:grpSpPr>
+      <p:sp>
+        <p:nvSpPr>
+          <p:cNvPr id="48130" name="Rectangle 1026"/>
+          <p:cNvSpPr>
+            <a:spLocks noGrp="1" noRot="1" noChangeAspect="1" noChangeArrowheads="1" noTextEdit="1"/>
+          </p:cNvSpPr>
+          <p:nvPr>
+            <p:ph type="sldImg"/>
+          </p:nvPr>
+        </p:nvSpPr>
+        <p:spPr>
+          <a:xfrm>
+            <a:off x="381000" y="685800"/>
+            <a:ext cx="6096000" cy="3429000"/>
+          </a:xfrm>
+          <a:solidFill>
+            <a:srgbClr val="FFFFFF"/>
+          </a:solidFill>
+          <a:ln/>
+        </p:spPr>
+      </p:sp>
+      <p:sp>
+        <p:nvSpPr>
+          <p:cNvPr id="48131" name="Rectangle 1027"/>
+          <p:cNvSpPr>
+            <a:spLocks noGrp="1" noChangeArrowheads="1"/>
+          </p:cNvSpPr>
+          <p:nvPr>
+            <p:ph type="body" idx="1"/>
+          </p:nvPr>
+        </p:nvSpPr>
+        <p:spPr>
+          <a:xfrm>
+            <a:off x="686421" y="4342467"/>
+            <a:ext cx="5485158" cy="4116049"/>
+          </a:xfrm>
+          <a:solidFill>
+            <a:srgbClr val="FFFFFF"/>
+          </a:solidFill>
+          <a:ln>
+            <a:solidFill>
+              <a:srgbClr val="000000"/>
+            </a:solidFill>
+          </a:ln>
+        </p:spPr>
+        <p:txBody>
+          <a:bodyPr lIns="89715" tIns="44856" rIns="89715" bIns="44856"/>
+          <a:lstStyle/>
+          <a:p>
+            <a:endParaRPr lang="en-CA" sz="1000" dirty="0"/>
+          </a:p>
+        </p:txBody>
+      </p:sp>
+    </p:spTree>
+    <p:extLst>
+      <p:ext uri="{BB962C8B-B14F-4D97-AF65-F5344CB8AC3E}">
         <p14:creationId xmlns:p14="http://schemas.microsoft.com/office/powerpoint/2010/main" val="1467782401"/>
       </p:ext>
     </p:extLst>
@@ -3238,7 +3412,7 @@
 </p:notes>
 </file>
 
-<file path=ppt/notesSlides/notesSlide37.xml><?xml version="1.0" encoding="utf-8"?>
+<file path=ppt/notesSlides/notesSlide39.xml><?xml version="1.0" encoding="utf-8"?>
 <p:notes xmlns:a="http://schemas.openxmlformats.org/drawingml/2006/main" xmlns:r="http://schemas.openxmlformats.org/officeDocument/2006/relationships" xmlns:p="http://schemas.openxmlformats.org/presentationml/2006/main">
   <p:cSld>
     <p:spTree>
@@ -8320,35 +8494,7 @@
                 <a:ea typeface="Helvetica Neue" panose="02000503000000020004" pitchFamily="2"/>
                 <a:cs typeface="Arial" panose="020B0604020202020204" pitchFamily="34" charset="0"/>
               </a:rPr>
-              <a:t>V1.0 – </a:t>
-            </a:r>
-            <a:r>
-              <a:rPr lang="fr-FR" sz="1600" spc="300" dirty="0" smtClean="0">
-                <a:solidFill>
-                  <a:schemeClr val="tx1">
-                    <a:lumMod val="50000"/>
-                    <a:lumOff val="50000"/>
-                  </a:schemeClr>
-                </a:solidFill>
-                <a:latin typeface="Arial" panose="020B0604020202020204" pitchFamily="34" charset="0"/>
-                <a:ea typeface="Helvetica Neue" panose="02000503000000020004" pitchFamily="2"/>
-                <a:cs typeface="Arial" panose="020B0604020202020204" pitchFamily="34" charset="0"/>
-              </a:rPr>
-              <a:t>09 et 10 </a:t>
-            </a:r>
-            <a:r>
-              <a:rPr lang="fr-FR" sz="1600" spc="300" dirty="0" smtClean="0">
-                <a:solidFill>
-                  <a:schemeClr val="tx1">
-                    <a:lumMod val="50000"/>
-                    <a:lumOff val="50000"/>
-                  </a:schemeClr>
-                </a:solidFill>
-                <a:latin typeface="Arial" panose="020B0604020202020204" pitchFamily="34" charset="0"/>
-                <a:ea typeface="Helvetica Neue" panose="02000503000000020004" pitchFamily="2"/>
-                <a:cs typeface="Arial" panose="020B0604020202020204" pitchFamily="34" charset="0"/>
-              </a:rPr>
-              <a:t>Mars 2020</a:t>
+              <a:t>V1.0 – 09 et 10 Mars 2020</a:t>
             </a:r>
             <a:endParaRPr lang="fr-FR" sz="1600" spc="300" dirty="0">
               <a:solidFill>
@@ -8881,11 +9027,7 @@
           <a:p>
             <a:r>
               <a:rPr lang="fr-FR" sz="3600" b="1" dirty="0" smtClean="0"/>
-              <a:t>C’est quoi PHP </a:t>
-            </a:r>
-            <a:r>
-              <a:rPr lang="fr-FR" sz="3600" b="1" dirty="0" smtClean="0"/>
-              <a:t>?</a:t>
+              <a:t>C’est quoi PHP ?</a:t>
             </a:r>
             <a:br>
               <a:rPr lang="fr-FR" sz="3600" b="1" dirty="0" smtClean="0"/>
@@ -9051,7 +9193,7 @@
               <a:pPr>
                 <a:defRPr/>
               </a:pPr>
-              <a:t>23:49:28</a:t>
+              <a:t>08:32:32</a:t>
             </a:fld>
             <a:endParaRPr lang="fr-FR" dirty="0"/>
           </a:p>
@@ -9176,11 +9318,7 @@
           <a:p>
             <a:r>
               <a:rPr lang="fr-FR" sz="3600" b="1" dirty="0" smtClean="0"/>
-              <a:t>C’est quoi PHP </a:t>
-            </a:r>
-            <a:r>
-              <a:rPr lang="fr-FR" sz="3600" b="1" dirty="0" smtClean="0"/>
-              <a:t>?</a:t>
+              <a:t>C’est quoi PHP ?</a:t>
             </a:r>
             <a:br>
               <a:rPr lang="fr-FR" sz="3600" b="1" dirty="0" smtClean="0"/>
@@ -9324,7 +9462,7 @@
               <a:pPr>
                 <a:defRPr/>
               </a:pPr>
-              <a:t>23:21:57</a:t>
+              <a:t>08:32:32</a:t>
             </a:fld>
             <a:endParaRPr lang="fr-FR" dirty="0"/>
           </a:p>
@@ -9461,11 +9599,7 @@
           <a:p>
             <a:r>
               <a:rPr lang="fr-FR" sz="3600" b="1" dirty="0" smtClean="0"/>
-              <a:t>C’est quoi PHP </a:t>
-            </a:r>
-            <a:r>
-              <a:rPr lang="fr-FR" sz="3600" b="1" dirty="0" smtClean="0"/>
-              <a:t>?</a:t>
+              <a:t>C’est quoi PHP ?</a:t>
             </a:r>
             <a:br>
               <a:rPr lang="fr-FR" sz="3600" b="1" dirty="0" smtClean="0"/>
@@ -9609,7 +9743,7 @@
               <a:pPr>
                 <a:defRPr/>
               </a:pPr>
-              <a:t>23:23:51</a:t>
+              <a:t>08:32:32</a:t>
             </a:fld>
             <a:endParaRPr lang="fr-FR" dirty="0"/>
           </a:p>
@@ -9833,12 +9967,6 @@
               </a:rPr>
               <a:t>&lt;/body&gt;&lt;/html&gt;</a:t>
             </a:r>
-            <a:endParaRPr lang="en" dirty="0">
-              <a:latin typeface="Consolas"/>
-              <a:ea typeface="Consolas"/>
-              <a:cs typeface="Consolas"/>
-              <a:sym typeface="Consolas"/>
-            </a:endParaRPr>
           </a:p>
         </p:txBody>
       </p:sp>
@@ -9899,11 +10027,7 @@
           <a:p>
             <a:r>
               <a:rPr lang="fr-FR" sz="3600" b="1" dirty="0" smtClean="0"/>
-              <a:t>C’est quoi PHP </a:t>
-            </a:r>
-            <a:r>
-              <a:rPr lang="fr-FR" sz="3600" b="1" dirty="0" smtClean="0"/>
-              <a:t>?</a:t>
+              <a:t>C’est quoi PHP ?</a:t>
             </a:r>
             <a:br>
               <a:rPr lang="fr-FR" sz="3600" b="1" dirty="0" smtClean="0"/>
@@ -10047,7 +10171,7 @@
               <a:pPr>
                 <a:defRPr/>
               </a:pPr>
-              <a:t>23:27:39</a:t>
+              <a:t>08:32:32</a:t>
             </a:fld>
             <a:endParaRPr lang="fr-FR" dirty="0"/>
           </a:p>
@@ -10361,12 +10485,6 @@
               </a:rPr>
               <a:t>&lt;/body&gt;&lt;/html&gt;</a:t>
             </a:r>
-            <a:endParaRPr lang="en" dirty="0">
-              <a:latin typeface="Consolas"/>
-              <a:ea typeface="Consolas"/>
-              <a:cs typeface="Consolas"/>
-              <a:sym typeface="Consolas"/>
-            </a:endParaRPr>
           </a:p>
         </p:txBody>
       </p:sp>
@@ -10427,11 +10545,7 @@
           <a:p>
             <a:r>
               <a:rPr lang="fr-FR" sz="3600" b="1" dirty="0" smtClean="0"/>
-              <a:t>C’est quoi PHP </a:t>
-            </a:r>
-            <a:r>
-              <a:rPr lang="fr-FR" sz="3600" b="1" dirty="0" smtClean="0"/>
-              <a:t>?</a:t>
+              <a:t>C’est quoi PHP ?</a:t>
             </a:r>
             <a:br>
               <a:rPr lang="fr-FR" sz="3600" b="1" dirty="0" smtClean="0"/>
@@ -10575,7 +10689,7 @@
               <a:pPr>
                 <a:defRPr/>
               </a:pPr>
-              <a:t>23:31:27</a:t>
+              <a:t>08:32:32</a:t>
             </a:fld>
             <a:endParaRPr lang="fr-FR" dirty="0"/>
           </a:p>
@@ -10682,11 +10796,7 @@
           <a:p>
             <a:r>
               <a:rPr lang="fr-FR" sz="3600" b="1" dirty="0" smtClean="0"/>
-              <a:t>C’est quoi PHP </a:t>
-            </a:r>
-            <a:r>
-              <a:rPr lang="fr-FR" sz="3600" b="1" dirty="0" smtClean="0"/>
-              <a:t>?</a:t>
+              <a:t>C’est quoi PHP ?</a:t>
             </a:r>
             <a:br>
               <a:rPr lang="fr-FR" sz="3600" b="1" dirty="0" smtClean="0"/>
@@ -10830,7 +10940,7 @@
               <a:pPr>
                 <a:defRPr/>
               </a:pPr>
-              <a:t>23:36:25</a:t>
+              <a:t>08:32:32</a:t>
             </a:fld>
             <a:endParaRPr lang="fr-FR" dirty="0"/>
           </a:p>
@@ -10980,11 +11090,7 @@
           <a:p>
             <a:r>
               <a:rPr lang="fr-FR" sz="3600" b="1" dirty="0" smtClean="0"/>
-              <a:t>C’est quoi PHP </a:t>
-            </a:r>
-            <a:r>
-              <a:rPr lang="fr-FR" sz="3600" b="1" dirty="0" smtClean="0"/>
-              <a:t>?</a:t>
+              <a:t>C’est quoi PHP ?</a:t>
             </a:r>
             <a:br>
               <a:rPr lang="fr-FR" sz="3600" b="1" dirty="0" smtClean="0"/>
@@ -11128,7 +11234,7 @@
               <a:pPr>
                 <a:defRPr/>
               </a:pPr>
-              <a:t>23:37:30</a:t>
+              <a:t>08:32:32</a:t>
             </a:fld>
             <a:endParaRPr lang="fr-FR" dirty="0"/>
           </a:p>
@@ -11317,11 +11423,7 @@
           <a:p>
             <a:r>
               <a:rPr lang="fr-FR" sz="3600" b="1" dirty="0" smtClean="0"/>
-              <a:t>C’est quoi PHP </a:t>
-            </a:r>
-            <a:r>
-              <a:rPr lang="fr-FR" sz="3600" b="1" dirty="0" smtClean="0"/>
-              <a:t>?</a:t>
+              <a:t>C’est quoi PHP ?</a:t>
             </a:r>
             <a:br>
               <a:rPr lang="fr-FR" sz="3600" b="1" dirty="0" smtClean="0"/>
@@ -11465,7 +11567,7 @@
               <a:pPr>
                 <a:defRPr/>
               </a:pPr>
-              <a:t>23:39:51</a:t>
+              <a:t>08:32:32</a:t>
             </a:fld>
             <a:endParaRPr lang="fr-FR" dirty="0"/>
           </a:p>
@@ -11631,11 +11733,7 @@
           <a:p>
             <a:r>
               <a:rPr lang="fr-FR" sz="3600" b="1" dirty="0" smtClean="0"/>
-              <a:t>C’est quoi PHP </a:t>
-            </a:r>
-            <a:r>
-              <a:rPr lang="fr-FR" sz="3600" b="1" dirty="0" smtClean="0"/>
-              <a:t>?</a:t>
+              <a:t>C’est quoi PHP ?</a:t>
             </a:r>
             <a:br>
               <a:rPr lang="fr-FR" sz="3600" b="1" dirty="0" smtClean="0"/>
@@ -11779,7 +11877,7 @@
               <a:pPr>
                 <a:defRPr/>
               </a:pPr>
-              <a:t>23:53:48</a:t>
+              <a:t>08:32:32</a:t>
             </a:fld>
             <a:endParaRPr lang="fr-FR" dirty="0"/>
           </a:p>
@@ -11982,11 +12080,7 @@
           <a:p>
             <a:r>
               <a:rPr lang="fr-FR" sz="3600" b="1" dirty="0" smtClean="0"/>
-              <a:t>C’est quoi PHP </a:t>
-            </a:r>
-            <a:r>
-              <a:rPr lang="fr-FR" sz="3600" b="1" dirty="0" smtClean="0"/>
-              <a:t>?</a:t>
+              <a:t>C’est quoi PHP ?</a:t>
             </a:r>
             <a:br>
               <a:rPr lang="fr-FR" sz="3600" b="1" dirty="0" smtClean="0"/>
@@ -12130,7 +12224,7 @@
               <a:pPr>
                 <a:defRPr/>
               </a:pPr>
-              <a:t>23:55:57</a:t>
+              <a:t>08:32:32</a:t>
             </a:fld>
             <a:endParaRPr lang="fr-FR" dirty="0"/>
           </a:p>
@@ -12398,11 +12492,7 @@
             </a:pPr>
             <a:r>
               <a:rPr lang="fr-FR" sz="2400" dirty="0" smtClean="0"/>
-              <a:t>Lundi : Cours PHP – </a:t>
-            </a:r>
-            <a:r>
-              <a:rPr lang="fr-FR" sz="2400" dirty="0" smtClean="0"/>
-              <a:t>Généralités – </a:t>
+              <a:t>Lundi : Cours PHP – Généralités – </a:t>
             </a:r>
             <a:r>
               <a:rPr lang="fr-FR" sz="2400" dirty="0" err="1" smtClean="0"/>
@@ -12540,11 +12630,7 @@
           <a:p>
             <a:r>
               <a:rPr lang="fr-FR" sz="3600" b="1" dirty="0" smtClean="0"/>
-              <a:t>C’est quoi PHP </a:t>
-            </a:r>
-            <a:r>
-              <a:rPr lang="fr-FR" sz="3600" b="1" dirty="0" smtClean="0"/>
-              <a:t>?</a:t>
+              <a:t>C’est quoi PHP ?</a:t>
             </a:r>
             <a:br>
               <a:rPr lang="fr-FR" sz="3600" b="1" dirty="0" smtClean="0"/>
@@ -12688,7 +12774,7 @@
               <a:pPr>
                 <a:defRPr/>
               </a:pPr>
-              <a:t>23:57:34</a:t>
+              <a:t>08:32:32</a:t>
             </a:fld>
             <a:endParaRPr lang="fr-FR" dirty="0"/>
           </a:p>
@@ -12860,11 +12946,7 @@
           <a:p>
             <a:r>
               <a:rPr lang="fr-FR" sz="3600" b="1" dirty="0" smtClean="0"/>
-              <a:t>C’est quoi PHP </a:t>
-            </a:r>
-            <a:r>
-              <a:rPr lang="fr-FR" sz="3600" b="1" dirty="0" smtClean="0"/>
-              <a:t>?</a:t>
+              <a:t>C’est quoi PHP ?</a:t>
             </a:r>
             <a:br>
               <a:rPr lang="fr-FR" sz="3600" b="1" dirty="0" smtClean="0"/>
@@ -13008,7 +13090,7 @@
               <a:pPr>
                 <a:defRPr/>
               </a:pPr>
-              <a:t>23:59:15</a:t>
+              <a:t>08:32:32</a:t>
             </a:fld>
             <a:endParaRPr lang="fr-FR" dirty="0"/>
           </a:p>
@@ -13198,11 +13280,7 @@
           <a:p>
             <a:r>
               <a:rPr lang="fr-FR" sz="3600" b="1" dirty="0" smtClean="0"/>
-              <a:t>C’est quoi PHP </a:t>
-            </a:r>
-            <a:r>
-              <a:rPr lang="fr-FR" sz="3600" b="1" dirty="0" smtClean="0"/>
-              <a:t>?</a:t>
+              <a:t>C’est quoi PHP ?</a:t>
             </a:r>
             <a:br>
               <a:rPr lang="fr-FR" sz="3600" b="1" dirty="0" smtClean="0"/>
@@ -13354,7 +13432,7 @@
               <a:pPr>
                 <a:defRPr/>
               </a:pPr>
-              <a:t>00:00:40</a:t>
+              <a:t>08:32:32</a:t>
             </a:fld>
             <a:endParaRPr lang="fr-FR" dirty="0"/>
           </a:p>
@@ -13756,11 +13834,7 @@
             </a:pPr>
             <a:r>
               <a:rPr lang="fr-FR" sz="3200" b="1" dirty="0" smtClean="0"/>
-              <a:t>C’est quoi PHP </a:t>
-            </a:r>
-            <a:r>
-              <a:rPr lang="fr-FR" sz="3200" b="1" dirty="0" smtClean="0"/>
-              <a:t>?</a:t>
+              <a:t>C’est quoi PHP ?</a:t>
             </a:r>
           </a:p>
           <a:p>
@@ -13772,7 +13846,6 @@
               <a:rPr lang="fr-FR" sz="1600" dirty="0" smtClean="0"/>
               <a:t>Quelles sont vos connaissances ?</a:t>
             </a:r>
-            <a:endParaRPr lang="fr-FR" sz="1600" dirty="0" smtClean="0"/>
           </a:p>
           <a:p>
             <a:pPr marL="798513" lvl="1" indent="-341313">
@@ -13896,7 +13969,6 @@
               <a:rPr lang="fr-FR" sz="2800" b="1" dirty="0" smtClean="0"/>
               <a:t>Débuguer son code</a:t>
             </a:r>
-            <a:endParaRPr lang="fr-FR" sz="2800" b="1" dirty="0" smtClean="0"/>
           </a:p>
           <a:p>
             <a:pPr marL="798513" lvl="1" indent="-341313">
@@ -13907,7 +13979,6 @@
               <a:rPr lang="fr-FR" sz="1400" dirty="0" smtClean="0"/>
               <a:t>La configuration</a:t>
             </a:r>
-            <a:endParaRPr lang="fr-FR" sz="1400" dirty="0" smtClean="0"/>
           </a:p>
           <a:p>
             <a:pPr marL="798513" lvl="1" indent="-341313">
@@ -13918,7 +13989,6 @@
               <a:rPr lang="fr-FR" sz="1400" dirty="0" smtClean="0"/>
               <a:t>Les erreurs classiques</a:t>
             </a:r>
-            <a:endParaRPr lang="fr-FR" sz="1400" dirty="0" smtClean="0"/>
           </a:p>
           <a:p>
             <a:pPr marL="798513" lvl="1" indent="-341313">
@@ -14364,7 +14434,7 @@
               <a:pPr>
                 <a:defRPr/>
               </a:pPr>
-              <a:t>01:16:34</a:t>
+              <a:t>08:32:32</a:t>
             </a:fld>
             <a:endParaRPr lang="fr-FR" dirty="0"/>
           </a:p>
@@ -14612,7 +14682,7 @@
               <a:pPr>
                 <a:defRPr/>
               </a:pPr>
-              <a:t>01:05:49</a:t>
+              <a:t>08:32:32</a:t>
             </a:fld>
             <a:endParaRPr lang="fr-FR" dirty="0"/>
           </a:p>
@@ -14809,15 +14879,7 @@
                   <a:srgbClr val="C00000"/>
                 </a:solidFill>
               </a:rPr>
-              <a:t>Petit e</a:t>
-            </a:r>
-            <a:r>
-              <a:rPr lang="fr-FR" sz="2700" b="1" dirty="0" smtClean="0">
-                <a:solidFill>
-                  <a:srgbClr val="C00000"/>
-                </a:solidFill>
-              </a:rPr>
-              <a:t>xercice (1h 30)</a:t>
+              <a:t>Petit exercice (1h 30)</a:t>
             </a:r>
             <a:endParaRPr lang="fr-FR" sz="2700" b="1" dirty="0">
               <a:solidFill>
@@ -14950,7 +15012,7 @@
               <a:pPr>
                 <a:defRPr/>
               </a:pPr>
-              <a:t>01:28:09</a:t>
+              <a:t>08:32:32</a:t>
             </a:fld>
             <a:endParaRPr lang="fr-FR" dirty="0"/>
           </a:p>
@@ -14965,7 +15027,7 @@
         <p:spPr>
           <a:xfrm>
             <a:off x="596901" y="1101258"/>
-            <a:ext cx="10985500" cy="6001643"/>
+            <a:ext cx="10985500" cy="6370975"/>
           </a:xfrm>
           <a:prstGeom prst="rect">
             <a:avLst/>
@@ -14987,7 +15049,11 @@
             </a:r>
             <a:r>
               <a:rPr lang="fr-FR" sz="2400" dirty="0" smtClean="0"/>
-              <a:t>qui gère deux types de produits : </a:t>
+              <a:t>ROOT (à définir en constante) qui </a:t>
+            </a:r>
+            <a:r>
+              <a:rPr lang="fr-FR" sz="2400" dirty="0" smtClean="0"/>
+              <a:t>gère deux types de produits : </a:t>
             </a:r>
           </a:p>
           <a:p>
@@ -15188,11 +15254,7 @@
             </a:pPr>
             <a:r>
               <a:rPr lang="fr-FR" sz="3200" b="1" dirty="0" smtClean="0"/>
-              <a:t>C’est quoi PHP </a:t>
-            </a:r>
-            <a:r>
-              <a:rPr lang="fr-FR" sz="3200" b="1" dirty="0" smtClean="0"/>
-              <a:t>?</a:t>
+              <a:t>C’est quoi PHP ?</a:t>
             </a:r>
           </a:p>
           <a:p>
@@ -15204,7 +15266,6 @@
               <a:rPr lang="fr-FR" sz="1600" dirty="0" smtClean="0"/>
               <a:t>Quelles sont vos connaissances ?</a:t>
             </a:r>
-            <a:endParaRPr lang="fr-FR" sz="1600" dirty="0" smtClean="0"/>
           </a:p>
           <a:p>
             <a:pPr marL="798513" lvl="1" indent="-341313">
@@ -15304,11 +15365,6 @@
               </a:rPr>
               <a:t>Débuguer son code</a:t>
             </a:r>
-            <a:endParaRPr lang="fr-FR" sz="2800" b="1" dirty="0" smtClean="0">
-              <a:solidFill>
-                <a:srgbClr val="C00000"/>
-              </a:solidFill>
-            </a:endParaRPr>
           </a:p>
           <a:p>
             <a:pPr marL="798513" lvl="1" indent="-341313">
@@ -15323,11 +15379,6 @@
               </a:rPr>
               <a:t>La configuration</a:t>
             </a:r>
-            <a:endParaRPr lang="fr-FR" sz="1400" dirty="0" smtClean="0">
-              <a:solidFill>
-                <a:srgbClr val="C00000"/>
-              </a:solidFill>
-            </a:endParaRPr>
           </a:p>
           <a:p>
             <a:pPr marL="798513" lvl="1" indent="-341313">
@@ -15342,11 +15393,6 @@
               </a:rPr>
               <a:t>Les erreurs fréquentes</a:t>
             </a:r>
-            <a:endParaRPr lang="fr-FR" sz="1400" dirty="0" smtClean="0">
-              <a:solidFill>
-                <a:srgbClr val="C00000"/>
-              </a:solidFill>
-            </a:endParaRPr>
           </a:p>
           <a:p>
             <a:pPr marL="798513" lvl="1" indent="-341313">
@@ -15456,12 +15502,16 @@
               <a:buChar char="•"/>
             </a:pPr>
             <a:r>
-              <a:rPr lang="fr-FR" dirty="0" err="1"/>
-              <a:t>Controlleur</a:t>
+              <a:rPr lang="fr-FR" dirty="0" err="1" smtClean="0"/>
+              <a:t>Controleur</a:t>
+            </a:r>
+            <a:r>
+              <a:rPr lang="fr-FR" dirty="0" smtClean="0"/>
+              <a:t> </a:t>
             </a:r>
             <a:r>
               <a:rPr lang="fr-FR" dirty="0"/>
-              <a:t> et </a:t>
+              <a:t>et </a:t>
             </a:r>
             <a:r>
               <a:rPr lang="fr-FR" dirty="0" smtClean="0"/>
@@ -15666,12 +15716,7 @@
             <p:ph type="title"/>
           </p:nvPr>
         </p:nvSpPr>
-        <p:spPr>
-          <a:xfrm>
-            <a:off x="596901" y="185739"/>
-            <a:ext cx="10985500" cy="920750"/>
-          </a:xfrm>
-        </p:spPr>
+        <p:spPr/>
         <p:txBody>
           <a:bodyPr>
             <a:normAutofit/>
@@ -15679,359 +15724,806 @@
           <a:lstStyle/>
           <a:p>
             <a:r>
-              <a:rPr lang="fr-FR" sz="3600" b="1" dirty="0" err="1" smtClean="0"/>
-              <a:t>Debuguer</a:t>
-            </a:r>
-            <a:r>
-              <a:rPr lang="fr-FR" sz="3600" b="1" dirty="0" smtClean="0"/>
-              <a:t> son code </a:t>
-            </a:r>
-            <a:br>
-              <a:rPr lang="fr-FR" sz="3600" b="1" dirty="0" smtClean="0"/>
-            </a:br>
-            <a:r>
-              <a:rPr lang="fr-FR" sz="2700" b="1" dirty="0" smtClean="0">
-                <a:solidFill>
-                  <a:srgbClr val="C00000"/>
-                </a:solidFill>
-              </a:rPr>
-              <a:t>La configuration</a:t>
-            </a:r>
-            <a:endParaRPr lang="fr-FR" sz="2700" b="1" dirty="0">
-              <a:solidFill>
-                <a:srgbClr val="C00000"/>
-              </a:solidFill>
-            </a:endParaRPr>
+              <a:rPr lang="fr-FR" dirty="0"/>
+              <a:t>Cours PHP </a:t>
+            </a:r>
+            <a:r>
+              <a:rPr lang="fr-FR" dirty="0" smtClean="0"/>
+              <a:t>– </a:t>
+            </a:r>
+            <a:r>
+              <a:rPr lang="en-US" b="0" dirty="0" smtClean="0"/>
+              <a:t>PSR</a:t>
+            </a:r>
+            <a:endParaRPr lang="en-US" b="0" dirty="0" smtClean="0"/>
           </a:p>
         </p:txBody>
       </p:sp>
       <p:sp>
         <p:nvSpPr>
-          <p:cNvPr id="5" name="Espace réservé de la date 4"/>
-          <p:cNvSpPr txBox="1">
-            <a:spLocks/>
+          <p:cNvPr id="4" name="Rectangle 3"/>
+          <p:cNvSpPr>
+            <a:spLocks noChangeArrowheads="1"/>
           </p:cNvSpPr>
           <p:nvPr/>
         </p:nvSpPr>
-        <p:spPr>
+        <p:spPr bwMode="auto">
           <a:xfrm>
-            <a:off x="11125200" y="0"/>
-            <a:ext cx="1886000" cy="432486"/>
+            <a:off x="677904" y="1794671"/>
+            <a:ext cx="10573191" cy="3570208"/>
           </a:xfrm>
           <a:prstGeom prst="rect">
             <a:avLst/>
           </a:prstGeom>
+          <a:solidFill>
+            <a:srgbClr val="FFFFFF"/>
+          </a:solidFill>
+          <a:ln>
+            <a:noFill/>
+          </a:ln>
+          <a:effectLst/>
+          <a:extLst>
+            <a:ext uri="{91240B29-F687-4F45-9708-019B960494DF}">
+              <a14:hiddenLine xmlns:a14="http://schemas.microsoft.com/office/drawing/2010/main" w="9525">
+                <a:solidFill>
+                  <a:schemeClr val="tx1"/>
+                </a:solidFill>
+                <a:miter lim="800000"/>
+                <a:headEnd/>
+                <a:tailEnd/>
+              </a14:hiddenLine>
+            </a:ext>
+            <a:ext uri="{AF507438-7753-43E0-B8FC-AC1667EBCBE1}">
+              <a14:hiddenEffects xmlns:a14="http://schemas.microsoft.com/office/drawing/2010/main">
+                <a:effectLst>
+                  <a:outerShdw dist="35921" dir="2700000" algn="ctr" rotWithShape="0">
+                    <a:schemeClr val="bg2"/>
+                  </a:outerShdw>
+                </a:effectLst>
+              </a14:hiddenEffects>
+            </a:ext>
+          </a:extLst>
         </p:spPr>
         <p:txBody>
-          <a:bodyPr/>
+          <a:bodyPr vert="horz" wrap="square" lIns="91440" tIns="45720" rIns="91440" bIns="45720" numCol="1" anchor="ctr" anchorCtr="0" compatLnSpc="1">
+            <a:prstTxWarp prst="textNoShape">
+              <a:avLst/>
+            </a:prstTxWarp>
+            <a:spAutoFit/>
+          </a:bodyPr>
           <a:lstStyle>
-            <a:defPPr>
-              <a:defRPr lang="en-US"/>
-            </a:defPPr>
-            <a:lvl1pPr marL="0" algn="l" defTabSz="914400" rtl="0" eaLnBrk="1" latinLnBrk="0" hangingPunct="1">
-              <a:defRPr sz="1800" kern="1200">
-                <a:solidFill>
-                  <a:schemeClr val="tx1"/>
-                </a:solidFill>
-                <a:latin typeface="+mn-lt"/>
-                <a:ea typeface="+mn-ea"/>
-                <a:cs typeface="+mn-cs"/>
+            <a:lvl1pPr eaLnBrk="0" fontAlgn="base" hangingPunct="0">
+              <a:spcBef>
+                <a:spcPct val="0"/>
+              </a:spcBef>
+              <a:spcAft>
+                <a:spcPct val="0"/>
+              </a:spcAft>
+              <a:defRPr>
+                <a:solidFill>
+                  <a:schemeClr val="tx1"/>
+                </a:solidFill>
+                <a:latin typeface="Arial" panose="020B0604020202020204" pitchFamily="34" charset="0"/>
               </a:defRPr>
             </a:lvl1pPr>
-            <a:lvl2pPr marL="457200" algn="l" defTabSz="914400" rtl="0" eaLnBrk="1" latinLnBrk="0" hangingPunct="1">
-              <a:defRPr sz="1800" kern="1200">
-                <a:solidFill>
-                  <a:schemeClr val="tx1"/>
-                </a:solidFill>
-                <a:latin typeface="+mn-lt"/>
-                <a:ea typeface="+mn-ea"/>
-                <a:cs typeface="+mn-cs"/>
+            <a:lvl2pPr eaLnBrk="0" fontAlgn="base" hangingPunct="0">
+              <a:spcBef>
+                <a:spcPct val="0"/>
+              </a:spcBef>
+              <a:spcAft>
+                <a:spcPct val="0"/>
+              </a:spcAft>
+              <a:defRPr>
+                <a:solidFill>
+                  <a:schemeClr val="tx1"/>
+                </a:solidFill>
+                <a:latin typeface="Arial" panose="020B0604020202020204" pitchFamily="34" charset="0"/>
               </a:defRPr>
             </a:lvl2pPr>
-            <a:lvl3pPr marL="914400" algn="l" defTabSz="914400" rtl="0" eaLnBrk="1" latinLnBrk="0" hangingPunct="1">
-              <a:defRPr sz="1800" kern="1200">
-                <a:solidFill>
-                  <a:schemeClr val="tx1"/>
-                </a:solidFill>
-                <a:latin typeface="+mn-lt"/>
-                <a:ea typeface="+mn-ea"/>
-                <a:cs typeface="+mn-cs"/>
+            <a:lvl3pPr eaLnBrk="0" fontAlgn="base" hangingPunct="0">
+              <a:spcBef>
+                <a:spcPct val="0"/>
+              </a:spcBef>
+              <a:spcAft>
+                <a:spcPct val="0"/>
+              </a:spcAft>
+              <a:defRPr>
+                <a:solidFill>
+                  <a:schemeClr val="tx1"/>
+                </a:solidFill>
+                <a:latin typeface="Arial" panose="020B0604020202020204" pitchFamily="34" charset="0"/>
               </a:defRPr>
             </a:lvl3pPr>
-            <a:lvl4pPr marL="1371600" algn="l" defTabSz="914400" rtl="0" eaLnBrk="1" latinLnBrk="0" hangingPunct="1">
-              <a:defRPr sz="1800" kern="1200">
-                <a:solidFill>
-                  <a:schemeClr val="tx1"/>
-                </a:solidFill>
-                <a:latin typeface="+mn-lt"/>
-                <a:ea typeface="+mn-ea"/>
-                <a:cs typeface="+mn-cs"/>
+            <a:lvl4pPr eaLnBrk="0" fontAlgn="base" hangingPunct="0">
+              <a:spcBef>
+                <a:spcPct val="0"/>
+              </a:spcBef>
+              <a:spcAft>
+                <a:spcPct val="0"/>
+              </a:spcAft>
+              <a:defRPr>
+                <a:solidFill>
+                  <a:schemeClr val="tx1"/>
+                </a:solidFill>
+                <a:latin typeface="Arial" panose="020B0604020202020204" pitchFamily="34" charset="0"/>
               </a:defRPr>
             </a:lvl4pPr>
-            <a:lvl5pPr marL="1828800" algn="l" defTabSz="914400" rtl="0" eaLnBrk="1" latinLnBrk="0" hangingPunct="1">
-              <a:defRPr sz="1800" kern="1200">
-                <a:solidFill>
-                  <a:schemeClr val="tx1"/>
-                </a:solidFill>
-                <a:latin typeface="+mn-lt"/>
-                <a:ea typeface="+mn-ea"/>
-                <a:cs typeface="+mn-cs"/>
+            <a:lvl5pPr eaLnBrk="0" fontAlgn="base" hangingPunct="0">
+              <a:spcBef>
+                <a:spcPct val="0"/>
+              </a:spcBef>
+              <a:spcAft>
+                <a:spcPct val="0"/>
+              </a:spcAft>
+              <a:defRPr>
+                <a:solidFill>
+                  <a:schemeClr val="tx1"/>
+                </a:solidFill>
+                <a:latin typeface="Arial" panose="020B0604020202020204" pitchFamily="34" charset="0"/>
               </a:defRPr>
             </a:lvl5pPr>
-            <a:lvl6pPr marL="2286000" algn="l" defTabSz="914400" rtl="0" eaLnBrk="1" latinLnBrk="0" hangingPunct="1">
-              <a:defRPr sz="1800" kern="1200">
-                <a:solidFill>
-                  <a:schemeClr val="tx1"/>
-                </a:solidFill>
-                <a:latin typeface="+mn-lt"/>
-                <a:ea typeface="+mn-ea"/>
-                <a:cs typeface="+mn-cs"/>
+            <a:lvl6pPr eaLnBrk="0" fontAlgn="base" hangingPunct="0">
+              <a:spcBef>
+                <a:spcPct val="0"/>
+              </a:spcBef>
+              <a:spcAft>
+                <a:spcPct val="0"/>
+              </a:spcAft>
+              <a:defRPr>
+                <a:solidFill>
+                  <a:schemeClr val="tx1"/>
+                </a:solidFill>
+                <a:latin typeface="Arial" panose="020B0604020202020204" pitchFamily="34" charset="0"/>
               </a:defRPr>
             </a:lvl6pPr>
-            <a:lvl7pPr marL="2743200" algn="l" defTabSz="914400" rtl="0" eaLnBrk="1" latinLnBrk="0" hangingPunct="1">
-              <a:defRPr sz="1800" kern="1200">
-                <a:solidFill>
-                  <a:schemeClr val="tx1"/>
-                </a:solidFill>
-                <a:latin typeface="+mn-lt"/>
-                <a:ea typeface="+mn-ea"/>
-                <a:cs typeface="+mn-cs"/>
+            <a:lvl7pPr eaLnBrk="0" fontAlgn="base" hangingPunct="0">
+              <a:spcBef>
+                <a:spcPct val="0"/>
+              </a:spcBef>
+              <a:spcAft>
+                <a:spcPct val="0"/>
+              </a:spcAft>
+              <a:defRPr>
+                <a:solidFill>
+                  <a:schemeClr val="tx1"/>
+                </a:solidFill>
+                <a:latin typeface="Arial" panose="020B0604020202020204" pitchFamily="34" charset="0"/>
               </a:defRPr>
             </a:lvl7pPr>
-            <a:lvl8pPr marL="3200400" algn="l" defTabSz="914400" rtl="0" eaLnBrk="1" latinLnBrk="0" hangingPunct="1">
-              <a:defRPr sz="1800" kern="1200">
-                <a:solidFill>
-                  <a:schemeClr val="tx1"/>
-                </a:solidFill>
-                <a:latin typeface="+mn-lt"/>
-                <a:ea typeface="+mn-ea"/>
-                <a:cs typeface="+mn-cs"/>
+            <a:lvl8pPr eaLnBrk="0" fontAlgn="base" hangingPunct="0">
+              <a:spcBef>
+                <a:spcPct val="0"/>
+              </a:spcBef>
+              <a:spcAft>
+                <a:spcPct val="0"/>
+              </a:spcAft>
+              <a:defRPr>
+                <a:solidFill>
+                  <a:schemeClr val="tx1"/>
+                </a:solidFill>
+                <a:latin typeface="Arial" panose="020B0604020202020204" pitchFamily="34" charset="0"/>
               </a:defRPr>
             </a:lvl8pPr>
-            <a:lvl9pPr marL="3657600" algn="l" defTabSz="914400" rtl="0" eaLnBrk="1" latinLnBrk="0" hangingPunct="1">
-              <a:defRPr sz="1800" kern="1200">
-                <a:solidFill>
-                  <a:schemeClr val="tx1"/>
-                </a:solidFill>
-                <a:latin typeface="+mn-lt"/>
-                <a:ea typeface="+mn-ea"/>
-                <a:cs typeface="+mn-cs"/>
+            <a:lvl9pPr eaLnBrk="0" fontAlgn="base" hangingPunct="0">
+              <a:spcBef>
+                <a:spcPct val="0"/>
+              </a:spcBef>
+              <a:spcAft>
+                <a:spcPct val="0"/>
+              </a:spcAft>
+              <a:defRPr>
+                <a:solidFill>
+                  <a:schemeClr val="tx1"/>
+                </a:solidFill>
+                <a:latin typeface="Arial" panose="020B0604020202020204" pitchFamily="34" charset="0"/>
               </a:defRPr>
             </a:lvl9pPr>
           </a:lstStyle>
           <a:p>
-            <a:pPr>
-              <a:defRPr/>
-            </a:pPr>
-            <a:fld id="{1FEAB85C-CFD1-4C7E-8896-8A3560B94D07}" type="datetime11">
-              <a:rPr lang="fr-FR" smtClean="0"/>
-              <a:pPr>
-                <a:defRPr/>
-              </a:pPr>
-              <a:t>01:42:01</a:t>
-            </a:fld>
-            <a:endParaRPr lang="fr-FR" dirty="0"/>
-          </a:p>
-        </p:txBody>
-      </p:sp>
-      <p:sp>
-        <p:nvSpPr>
-          <p:cNvPr id="2" name="Rectangle 1"/>
-          <p:cNvSpPr/>
-          <p:nvPr/>
-        </p:nvSpPr>
-        <p:spPr>
-          <a:xfrm>
-            <a:off x="609258" y="1274640"/>
-            <a:ext cx="10985500" cy="4247317"/>
-          </a:xfrm>
-          <a:prstGeom prst="rect">
-            <a:avLst/>
-          </a:prstGeom>
-        </p:spPr>
-        <p:txBody>
-          <a:bodyPr wrap="square">
-            <a:spAutoFit/>
-          </a:bodyPr>
-          <a:lstStyle/>
-          <a:p>
-            <a:pPr marL="342900" indent="-342900">
-              <a:buFont typeface="Arial" panose="020B0604020202020204" pitchFamily="34" charset="0"/>
+            <a:pPr marL="0" marR="0" lvl="0" indent="0" algn="l" defTabSz="914400" rtl="0" eaLnBrk="0" fontAlgn="base" latinLnBrk="0" hangingPunct="0">
+              <a:lnSpc>
+                <a:spcPct val="100000"/>
+              </a:lnSpc>
+              <a:spcBef>
+                <a:spcPct val="0"/>
+              </a:spcBef>
+              <a:spcAft>
+                <a:spcPct val="0"/>
+              </a:spcAft>
+              <a:buClrTx/>
+              <a:buSzTx/>
+              <a:buFontTx/>
+              <a:buNone/>
+              <a:tabLst/>
+            </a:pPr>
+            <a:r>
+              <a:rPr kumimoji="0" lang="fr-FR" altLang="fr-FR" b="0" i="0" u="none" strike="noStrike" cap="none" normalizeH="0" baseline="0" dirty="0" smtClean="0">
+                <a:ln>
+                  <a:noFill/>
+                </a:ln>
+                <a:solidFill>
+                  <a:srgbClr val="525252"/>
+                </a:solidFill>
+                <a:effectLst/>
+                <a:latin typeface="Arial" panose="020B0604020202020204" pitchFamily="34" charset="0"/>
+                <a:cs typeface="Arial" panose="020B0604020202020204" pitchFamily="34" charset="0"/>
+              </a:rPr>
+              <a:t>Les</a:t>
+            </a:r>
+            <a:r>
+              <a:rPr kumimoji="0" lang="fr-FR" altLang="fr-FR" b="1" i="0" u="none" strike="noStrike" cap="none" normalizeH="0" baseline="0" dirty="0" smtClean="0">
+                <a:ln>
+                  <a:noFill/>
+                </a:ln>
+                <a:solidFill>
+                  <a:srgbClr val="525252"/>
+                </a:solidFill>
+                <a:effectLst/>
+                <a:latin typeface="Arial" panose="020B0604020202020204" pitchFamily="34" charset="0"/>
+                <a:cs typeface="Arial" panose="020B0604020202020204" pitchFamily="34" charset="0"/>
+              </a:rPr>
+              <a:t> PSR</a:t>
+            </a:r>
+            <a:r>
+              <a:rPr kumimoji="0" lang="fr-FR" altLang="fr-FR" b="0" i="0" u="none" strike="noStrike" cap="none" normalizeH="0" baseline="0" dirty="0" smtClean="0">
+                <a:ln>
+                  <a:noFill/>
+                </a:ln>
+                <a:solidFill>
+                  <a:srgbClr val="525252"/>
+                </a:solidFill>
+                <a:effectLst/>
+                <a:latin typeface="Arial" panose="020B0604020202020204" pitchFamily="34" charset="0"/>
+                <a:cs typeface="Arial" panose="020B0604020202020204" pitchFamily="34" charset="0"/>
+              </a:rPr>
+              <a:t> (pour « Propose a Standards </a:t>
+            </a:r>
+            <a:r>
+              <a:rPr kumimoji="0" lang="fr-FR" altLang="fr-FR" b="0" i="0" u="none" strike="noStrike" cap="none" normalizeH="0" baseline="0" dirty="0" err="1" smtClean="0">
+                <a:ln>
+                  <a:noFill/>
+                </a:ln>
+                <a:solidFill>
+                  <a:srgbClr val="525252"/>
+                </a:solidFill>
+                <a:effectLst/>
+                <a:latin typeface="Arial" panose="020B0604020202020204" pitchFamily="34" charset="0"/>
+                <a:cs typeface="Arial" panose="020B0604020202020204" pitchFamily="34" charset="0"/>
+              </a:rPr>
+              <a:t>Recommendation</a:t>
+            </a:r>
+            <a:r>
+              <a:rPr kumimoji="0" lang="fr-FR" altLang="fr-FR" b="0" i="0" u="none" strike="noStrike" cap="none" normalizeH="0" baseline="0" dirty="0" smtClean="0">
+                <a:ln>
+                  <a:noFill/>
+                </a:ln>
+                <a:solidFill>
+                  <a:srgbClr val="525252"/>
+                </a:solidFill>
+                <a:effectLst/>
+                <a:latin typeface="Arial" panose="020B0604020202020204" pitchFamily="34" charset="0"/>
+                <a:cs typeface="Arial" panose="020B0604020202020204" pitchFamily="34" charset="0"/>
+              </a:rPr>
+              <a:t> ») sont des </a:t>
+            </a:r>
+            <a:r>
+              <a:rPr kumimoji="0" lang="fr-FR" altLang="fr-FR" b="1" i="0" u="none" strike="noStrike" cap="none" normalizeH="0" baseline="0" dirty="0" smtClean="0">
+                <a:ln>
+                  <a:noFill/>
+                </a:ln>
+                <a:solidFill>
+                  <a:srgbClr val="525252"/>
+                </a:solidFill>
+                <a:effectLst/>
+                <a:latin typeface="Arial" panose="020B0604020202020204" pitchFamily="34" charset="0"/>
+                <a:cs typeface="Arial" panose="020B0604020202020204" pitchFamily="34" charset="0"/>
+              </a:rPr>
+              <a:t>recommandations</a:t>
+            </a:r>
+            <a:r>
+              <a:rPr kumimoji="0" lang="fr-FR" altLang="fr-FR" b="0" i="0" u="none" strike="noStrike" cap="none" normalizeH="0" baseline="0" dirty="0" smtClean="0">
+                <a:ln>
+                  <a:noFill/>
+                </a:ln>
+                <a:solidFill>
+                  <a:srgbClr val="525252"/>
+                </a:solidFill>
+                <a:effectLst/>
+                <a:latin typeface="Arial" panose="020B0604020202020204" pitchFamily="34" charset="0"/>
+                <a:cs typeface="Arial" panose="020B0604020202020204" pitchFamily="34" charset="0"/>
+              </a:rPr>
+              <a:t> validées par le </a:t>
+            </a:r>
+            <a:r>
+              <a:rPr kumimoji="0" lang="fr-FR" altLang="fr-FR" b="0" i="0" u="none" strike="noStrike" cap="none" normalizeH="0" baseline="0" dirty="0" smtClean="0">
+                <a:ln>
+                  <a:noFill/>
+                </a:ln>
+                <a:solidFill>
+                  <a:srgbClr val="54A6DF"/>
+                </a:solidFill>
+                <a:effectLst/>
+                <a:latin typeface="Arial" panose="020B0604020202020204" pitchFamily="34" charset="0"/>
+                <a:cs typeface="Arial" panose="020B0604020202020204" pitchFamily="34" charset="0"/>
+                <a:hlinkClick r:id="rId3" tooltip="PHP Framework Interoperability Group"/>
+              </a:rPr>
+              <a:t>PHP Framework </a:t>
+            </a:r>
+            <a:r>
+              <a:rPr kumimoji="0" lang="fr-FR" altLang="fr-FR" b="0" i="0" u="none" strike="noStrike" cap="none" normalizeH="0" baseline="0" dirty="0" err="1" smtClean="0">
+                <a:ln>
+                  <a:noFill/>
+                </a:ln>
+                <a:solidFill>
+                  <a:srgbClr val="54A6DF"/>
+                </a:solidFill>
+                <a:effectLst/>
+                <a:latin typeface="Arial" panose="020B0604020202020204" pitchFamily="34" charset="0"/>
+                <a:cs typeface="Arial" panose="020B0604020202020204" pitchFamily="34" charset="0"/>
+                <a:hlinkClick r:id="rId3" tooltip="PHP Framework Interoperability Group"/>
+              </a:rPr>
+              <a:t>Interoperability</a:t>
+            </a:r>
+            <a:r>
+              <a:rPr kumimoji="0" lang="fr-FR" altLang="fr-FR" b="0" i="0" u="none" strike="noStrike" cap="none" normalizeH="0" baseline="0" dirty="0" smtClean="0">
+                <a:ln>
+                  <a:noFill/>
+                </a:ln>
+                <a:solidFill>
+                  <a:srgbClr val="54A6DF"/>
+                </a:solidFill>
+                <a:effectLst/>
+                <a:latin typeface="Arial" panose="020B0604020202020204" pitchFamily="34" charset="0"/>
+                <a:cs typeface="Arial" panose="020B0604020202020204" pitchFamily="34" charset="0"/>
+                <a:hlinkClick r:id="rId3" tooltip="PHP Framework Interoperability Group"/>
+              </a:rPr>
+              <a:t> Group</a:t>
+            </a:r>
+            <a:r>
+              <a:rPr kumimoji="0" lang="fr-FR" altLang="fr-FR" b="0" i="0" u="none" strike="noStrike" cap="none" normalizeH="0" baseline="0" dirty="0" smtClean="0">
+                <a:ln>
+                  <a:noFill/>
+                </a:ln>
+                <a:solidFill>
+                  <a:srgbClr val="525252"/>
+                </a:solidFill>
+                <a:effectLst/>
+                <a:latin typeface="Arial" panose="020B0604020202020204" pitchFamily="34" charset="0"/>
+                <a:cs typeface="Arial" panose="020B0604020202020204" pitchFamily="34" charset="0"/>
+              </a:rPr>
+              <a:t> (PHP </a:t>
+            </a:r>
+            <a:r>
+              <a:rPr kumimoji="0" lang="fr-FR" altLang="fr-FR" b="0" i="0" u="none" strike="noStrike" cap="none" normalizeH="0" baseline="0" dirty="0" err="1" smtClean="0">
+                <a:ln>
+                  <a:noFill/>
+                </a:ln>
+                <a:solidFill>
+                  <a:srgbClr val="525252"/>
+                </a:solidFill>
+                <a:effectLst/>
+                <a:latin typeface="Arial" panose="020B0604020202020204" pitchFamily="34" charset="0"/>
+                <a:cs typeface="Arial" panose="020B0604020202020204" pitchFamily="34" charset="0"/>
+              </a:rPr>
+              <a:t>fig</a:t>
+            </a:r>
+            <a:r>
+              <a:rPr kumimoji="0" lang="fr-FR" altLang="fr-FR" b="0" i="0" u="none" strike="noStrike" cap="none" normalizeH="0" baseline="0" dirty="0" smtClean="0">
+                <a:ln>
+                  <a:noFill/>
+                </a:ln>
+                <a:solidFill>
+                  <a:srgbClr val="525252"/>
+                </a:solidFill>
+                <a:effectLst/>
+                <a:latin typeface="Arial" panose="020B0604020202020204" pitchFamily="34" charset="0"/>
+                <a:cs typeface="Arial" panose="020B0604020202020204" pitchFamily="34" charset="0"/>
+              </a:rPr>
+              <a:t> :</a:t>
+            </a:r>
+            <a:r>
+              <a:rPr kumimoji="0" lang="fr-FR" altLang="fr-FR" b="0" i="0" u="none" strike="noStrike" cap="none" normalizeH="0" baseline="0" dirty="0" smtClean="0">
+                <a:ln>
+                  <a:noFill/>
+                </a:ln>
+                <a:solidFill>
+                  <a:srgbClr val="54A6DF"/>
+                </a:solidFill>
+                <a:effectLst/>
+                <a:latin typeface="Arial" panose="020B0604020202020204" pitchFamily="34" charset="0"/>
+                <a:cs typeface="Arial" panose="020B0604020202020204" pitchFamily="34" charset="0"/>
+                <a:hlinkClick r:id="rId4" tooltip="PHP fig"/>
+              </a:rPr>
+              <a:t> site officiel</a:t>
+            </a:r>
+            <a:r>
+              <a:rPr kumimoji="0" lang="fr-FR" altLang="fr-FR" b="0" i="0" u="none" strike="noStrike" cap="none" normalizeH="0" baseline="0" dirty="0" smtClean="0">
+                <a:ln>
+                  <a:noFill/>
+                </a:ln>
+                <a:solidFill>
+                  <a:srgbClr val="525252"/>
+                </a:solidFill>
+                <a:effectLst/>
+                <a:latin typeface="Arial" panose="020B0604020202020204" pitchFamily="34" charset="0"/>
+                <a:cs typeface="Arial" panose="020B0604020202020204" pitchFamily="34" charset="0"/>
+              </a:rPr>
+              <a:t>) ayant pour objectif d’améliorer l’interopérabilité entre les </a:t>
+            </a:r>
+            <a:r>
+              <a:rPr kumimoji="0" lang="fr-FR" altLang="fr-FR" b="0" i="0" u="none" strike="noStrike" cap="none" normalizeH="0" baseline="0" dirty="0" err="1" smtClean="0">
+                <a:ln>
+                  <a:noFill/>
+                </a:ln>
+                <a:solidFill>
+                  <a:srgbClr val="525252"/>
+                </a:solidFill>
+                <a:effectLst/>
+                <a:latin typeface="Arial" panose="020B0604020202020204" pitchFamily="34" charset="0"/>
+                <a:cs typeface="Arial" panose="020B0604020202020204" pitchFamily="34" charset="0"/>
+              </a:rPr>
+              <a:t>frameworks</a:t>
+            </a:r>
+            <a:r>
+              <a:rPr kumimoji="0" lang="fr-FR" altLang="fr-FR" b="0" i="0" u="none" strike="noStrike" cap="none" normalizeH="0" baseline="0" dirty="0" smtClean="0">
+                <a:ln>
+                  <a:noFill/>
+                </a:ln>
+                <a:solidFill>
+                  <a:srgbClr val="525252"/>
+                </a:solidFill>
+                <a:effectLst/>
+                <a:latin typeface="Arial" panose="020B0604020202020204" pitchFamily="34" charset="0"/>
+                <a:cs typeface="Arial" panose="020B0604020202020204" pitchFamily="34" charset="0"/>
+              </a:rPr>
+              <a:t> PHP, et plus généralement entre les développeurs PHP. Il ne s’agit aucunement de normes ou de standards </a:t>
+            </a:r>
+            <a:r>
+              <a:rPr kumimoji="0" lang="fr-FR" altLang="fr-FR" b="0" i="1" u="none" strike="noStrike" cap="none" normalizeH="0" baseline="0" dirty="0" smtClean="0">
+                <a:ln>
+                  <a:noFill/>
+                </a:ln>
+                <a:solidFill>
+                  <a:srgbClr val="525252"/>
+                </a:solidFill>
+                <a:effectLst/>
+                <a:latin typeface="Arial" panose="020B0604020202020204" pitchFamily="34" charset="0"/>
+                <a:cs typeface="Arial" panose="020B0604020202020204" pitchFamily="34" charset="0"/>
+              </a:rPr>
+              <a:t>établis</a:t>
+            </a:r>
+            <a:r>
+              <a:rPr kumimoji="0" lang="fr-FR" altLang="fr-FR" b="0" i="0" u="none" strike="noStrike" cap="none" normalizeH="0" baseline="0" dirty="0" smtClean="0">
+                <a:ln>
+                  <a:noFill/>
+                </a:ln>
+                <a:solidFill>
+                  <a:srgbClr val="525252"/>
+                </a:solidFill>
+                <a:effectLst/>
+                <a:latin typeface="Arial" panose="020B0604020202020204" pitchFamily="34" charset="0"/>
+                <a:cs typeface="Arial" panose="020B0604020202020204" pitchFamily="34" charset="0"/>
+              </a:rPr>
+              <a:t> mais de recommandations qui tendent à le devenir. D’un sens, les PSR sont similaires aux RFC (</a:t>
+            </a:r>
+            <a:r>
+              <a:rPr kumimoji="0" lang="fr-FR" altLang="fr-FR" b="0" i="0" u="none" strike="noStrike" cap="none" normalizeH="0" baseline="0" dirty="0" err="1" smtClean="0">
+                <a:ln>
+                  <a:noFill/>
+                </a:ln>
+                <a:solidFill>
+                  <a:srgbClr val="525252"/>
+                </a:solidFill>
+                <a:effectLst/>
+                <a:latin typeface="Arial" panose="020B0604020202020204" pitchFamily="34" charset="0"/>
+                <a:cs typeface="Arial" panose="020B0604020202020204" pitchFamily="34" charset="0"/>
+              </a:rPr>
+              <a:t>Request</a:t>
+            </a:r>
+            <a:r>
+              <a:rPr kumimoji="0" lang="fr-FR" altLang="fr-FR" b="0" i="0" u="none" strike="noStrike" cap="none" normalizeH="0" baseline="0" dirty="0" smtClean="0">
+                <a:ln>
+                  <a:noFill/>
+                </a:ln>
+                <a:solidFill>
+                  <a:srgbClr val="525252"/>
+                </a:solidFill>
+                <a:effectLst/>
+                <a:latin typeface="Arial" panose="020B0604020202020204" pitchFamily="34" charset="0"/>
+                <a:cs typeface="Arial" panose="020B0604020202020204" pitchFamily="34" charset="0"/>
+              </a:rPr>
+              <a:t> For Comment) qui régulent désormais le monde des réseaux.</a:t>
+            </a:r>
+            <a:endParaRPr kumimoji="0" lang="fr-FR" altLang="fr-FR" sz="1050" b="0" i="0" u="none" strike="noStrike" cap="none" normalizeH="0" baseline="0" dirty="0" smtClean="0">
+              <a:ln>
+                <a:noFill/>
+              </a:ln>
+              <a:solidFill>
+                <a:schemeClr val="tx1"/>
+              </a:solidFill>
+              <a:effectLst/>
+            </a:endParaRPr>
+          </a:p>
+          <a:p>
+            <a:pPr marL="0" marR="0" lvl="0" indent="0" algn="l" defTabSz="914400" rtl="0" eaLnBrk="0" fontAlgn="base" latinLnBrk="0" hangingPunct="0">
+              <a:lnSpc>
+                <a:spcPct val="100000"/>
+              </a:lnSpc>
+              <a:spcBef>
+                <a:spcPct val="0"/>
+              </a:spcBef>
+              <a:spcAft>
+                <a:spcPct val="0"/>
+              </a:spcAft>
+              <a:buClrTx/>
+              <a:buSzTx/>
+              <a:buFontTx/>
+              <a:buNone/>
+              <a:tabLst/>
+            </a:pPr>
+            <a:r>
+              <a:rPr kumimoji="0" lang="fr-FR" altLang="fr-FR" b="0" i="0" u="none" strike="noStrike" cap="none" normalizeH="0" baseline="0" dirty="0" smtClean="0">
+                <a:ln>
+                  <a:noFill/>
+                </a:ln>
+                <a:solidFill>
+                  <a:srgbClr val="525252"/>
+                </a:solidFill>
+                <a:effectLst/>
+                <a:latin typeface="Arial" panose="020B0604020202020204" pitchFamily="34" charset="0"/>
+                <a:cs typeface="Arial" panose="020B0604020202020204" pitchFamily="34" charset="0"/>
+              </a:rPr>
+              <a:t>A ce jour, les </a:t>
+            </a:r>
+            <a:r>
+              <a:rPr kumimoji="0" lang="fr-FR" altLang="fr-FR" b="0" i="0" u="none" strike="noStrike" cap="none" normalizeH="0" baseline="0" dirty="0" smtClean="0">
+                <a:ln>
+                  <a:noFill/>
+                </a:ln>
+                <a:solidFill>
+                  <a:srgbClr val="54A6DF"/>
+                </a:solidFill>
+                <a:effectLst/>
+                <a:latin typeface="Arial" panose="020B0604020202020204" pitchFamily="34" charset="0"/>
+                <a:cs typeface="Arial" panose="020B0604020202020204" pitchFamily="34" charset="0"/>
+                <a:hlinkClick r:id="rId5" tooltip="PSR validées"/>
+              </a:rPr>
+              <a:t>recommandations PSR validées</a:t>
+            </a:r>
+            <a:r>
+              <a:rPr kumimoji="0" lang="fr-FR" altLang="fr-FR" b="0" i="0" u="none" strike="noStrike" cap="none" normalizeH="0" baseline="0" dirty="0" smtClean="0">
+                <a:ln>
+                  <a:noFill/>
+                </a:ln>
+                <a:solidFill>
+                  <a:srgbClr val="525252"/>
+                </a:solidFill>
+                <a:effectLst/>
+                <a:latin typeface="Arial" panose="020B0604020202020204" pitchFamily="34" charset="0"/>
+                <a:cs typeface="Arial" panose="020B0604020202020204" pitchFamily="34" charset="0"/>
+              </a:rPr>
+              <a:t> sont aux nombres de 4 :</a:t>
+            </a:r>
+            <a:endParaRPr kumimoji="0" lang="fr-FR" altLang="fr-FR" sz="1050" b="0" i="0" u="none" strike="noStrike" cap="none" normalizeH="0" baseline="0" dirty="0" smtClean="0">
+              <a:ln>
+                <a:noFill/>
+              </a:ln>
+              <a:solidFill>
+                <a:schemeClr val="tx1"/>
+              </a:solidFill>
+              <a:effectLst/>
+            </a:endParaRPr>
+          </a:p>
+          <a:p>
+            <a:pPr marL="0" marR="0" lvl="0" indent="0" algn="l" defTabSz="914400" rtl="0" eaLnBrk="0" fontAlgn="base" latinLnBrk="0" hangingPunct="0">
+              <a:lnSpc>
+                <a:spcPct val="100000"/>
+              </a:lnSpc>
+              <a:spcBef>
+                <a:spcPct val="0"/>
+              </a:spcBef>
+              <a:spcAft>
+                <a:spcPct val="0"/>
+              </a:spcAft>
+              <a:buClrTx/>
+              <a:buSzTx/>
+              <a:buFontTx/>
               <a:buChar char="•"/>
-            </a:pPr>
-            <a:r>
-              <a:rPr lang="fr-FR" sz="2400" dirty="0" smtClean="0"/>
-              <a:t>La configuration php.ini</a:t>
-            </a:r>
-          </a:p>
-          <a:p>
-            <a:pPr marL="342900" indent="-342900">
-              <a:buFont typeface="Arial" panose="020B0604020202020204" pitchFamily="34" charset="0"/>
+              <a:tabLst/>
+            </a:pPr>
+            <a:r>
+              <a:rPr kumimoji="0" lang="fr-FR" altLang="fr-FR" b="0" i="0" u="none" strike="noStrike" cap="none" normalizeH="0" baseline="0" dirty="0" smtClean="0">
+                <a:ln>
+                  <a:noFill/>
+                </a:ln>
+                <a:solidFill>
+                  <a:srgbClr val="525252"/>
+                </a:solidFill>
+                <a:effectLst/>
+                <a:latin typeface="Arial" panose="020B0604020202020204" pitchFamily="34" charset="0"/>
+                <a:cs typeface="Arial" panose="020B0604020202020204" pitchFamily="34" charset="0"/>
+              </a:rPr>
+              <a:t>PSR-0 : qui traite du chargement des classes PHP et de l’</a:t>
+            </a:r>
+            <a:r>
+              <a:rPr kumimoji="0" lang="fr-FR" altLang="fr-FR" b="0" i="0" u="none" strike="noStrike" cap="none" normalizeH="0" baseline="0" dirty="0" err="1" smtClean="0">
+                <a:ln>
+                  <a:noFill/>
+                </a:ln>
+                <a:solidFill>
+                  <a:srgbClr val="525252"/>
+                </a:solidFill>
+                <a:effectLst/>
+                <a:latin typeface="Arial" panose="020B0604020202020204" pitchFamily="34" charset="0"/>
+                <a:cs typeface="Arial" panose="020B0604020202020204" pitchFamily="34" charset="0"/>
+              </a:rPr>
+              <a:t>autoloading</a:t>
+            </a:r>
+            <a:r>
+              <a:rPr kumimoji="0" lang="fr-FR" altLang="fr-FR" b="0" i="0" u="none" strike="noStrike" cap="none" normalizeH="0" baseline="0" dirty="0" smtClean="0">
+                <a:ln>
+                  <a:noFill/>
+                </a:ln>
+                <a:solidFill>
+                  <a:srgbClr val="525252"/>
+                </a:solidFill>
+                <a:effectLst/>
+                <a:latin typeface="Arial" panose="020B0604020202020204" pitchFamily="34" charset="0"/>
+                <a:cs typeface="Arial" panose="020B0604020202020204" pitchFamily="34" charset="0"/>
+              </a:rPr>
+              <a:t> ;</a:t>
+            </a:r>
+          </a:p>
+          <a:p>
+            <a:pPr marL="0" marR="0" lvl="0" indent="0" algn="l" defTabSz="914400" rtl="0" eaLnBrk="0" fontAlgn="base" latinLnBrk="0" hangingPunct="0">
+              <a:lnSpc>
+                <a:spcPct val="100000"/>
+              </a:lnSpc>
+              <a:spcBef>
+                <a:spcPct val="0"/>
+              </a:spcBef>
+              <a:spcAft>
+                <a:spcPct val="0"/>
+              </a:spcAft>
+              <a:buClrTx/>
+              <a:buSzTx/>
+              <a:buFontTx/>
               <a:buChar char="•"/>
-            </a:pPr>
-            <a:r>
-              <a:rPr lang="fr-FR" sz="2400" dirty="0" smtClean="0"/>
-              <a:t>Afficher la page de configuration de </a:t>
-            </a:r>
-            <a:r>
-              <a:rPr lang="fr-FR" sz="2400" dirty="0" err="1" smtClean="0"/>
-              <a:t>php</a:t>
-            </a:r>
-            <a:r>
-              <a:rPr lang="fr-FR" sz="2400" dirty="0" smtClean="0"/>
-              <a:t> via </a:t>
-            </a:r>
-            <a:r>
-              <a:rPr lang="fr-FR" sz="2400" dirty="0" err="1" smtClean="0"/>
-              <a:t>phpinfo</a:t>
-            </a:r>
-            <a:r>
-              <a:rPr lang="fr-FR" sz="2400" dirty="0" smtClean="0"/>
-              <a:t>()</a:t>
-            </a:r>
-          </a:p>
-          <a:p>
-            <a:pPr marL="342900" indent="-342900">
-              <a:buFont typeface="Arial" panose="020B0604020202020204" pitchFamily="34" charset="0"/>
+              <a:tabLst/>
+            </a:pPr>
+            <a:r>
+              <a:rPr kumimoji="0" lang="fr-FR" altLang="fr-FR" b="0" i="0" u="none" strike="noStrike" cap="none" normalizeH="0" baseline="0" dirty="0" smtClean="0">
+                <a:ln>
+                  <a:noFill/>
+                </a:ln>
+                <a:solidFill>
+                  <a:srgbClr val="525252"/>
+                </a:solidFill>
+                <a:effectLst/>
+                <a:latin typeface="Arial" panose="020B0604020202020204" pitchFamily="34" charset="0"/>
+                <a:cs typeface="Arial" panose="020B0604020202020204" pitchFamily="34" charset="0"/>
+              </a:rPr>
+              <a:t>PSR-1 : qui fixe les conventions minimales de codage ;</a:t>
+            </a:r>
+          </a:p>
+          <a:p>
+            <a:pPr marL="0" marR="0" lvl="0" indent="0" algn="l" defTabSz="914400" rtl="0" eaLnBrk="0" fontAlgn="base" latinLnBrk="0" hangingPunct="0">
+              <a:lnSpc>
+                <a:spcPct val="100000"/>
+              </a:lnSpc>
+              <a:spcBef>
+                <a:spcPct val="0"/>
+              </a:spcBef>
+              <a:spcAft>
+                <a:spcPct val="0"/>
+              </a:spcAft>
+              <a:buClrTx/>
+              <a:buSzTx/>
+              <a:buFontTx/>
               <a:buChar char="•"/>
-            </a:pPr>
-            <a:r>
-              <a:rPr lang="fr-FR" sz="2400" dirty="0" smtClean="0"/>
-              <a:t>Afficher ou masquer les erreurs</a:t>
-            </a:r>
-          </a:p>
-          <a:p>
-            <a:pPr marL="800100" lvl="1" indent="-342900">
-              <a:buFont typeface="Arial" panose="020B0604020202020204" pitchFamily="34" charset="0"/>
+              <a:tabLst/>
+            </a:pPr>
+            <a:r>
+              <a:rPr kumimoji="0" lang="fr-FR" altLang="fr-FR" b="0" i="0" u="none" strike="noStrike" cap="none" normalizeH="0" baseline="0" dirty="0" smtClean="0">
+                <a:ln>
+                  <a:noFill/>
+                </a:ln>
+                <a:solidFill>
+                  <a:srgbClr val="525252"/>
+                </a:solidFill>
+                <a:effectLst/>
+                <a:latin typeface="Arial" panose="020B0604020202020204" pitchFamily="34" charset="0"/>
+                <a:cs typeface="Arial" panose="020B0604020202020204" pitchFamily="34" charset="0"/>
+              </a:rPr>
+              <a:t>PSR-2 : qui défini le style et l’organisation du code ;</a:t>
+            </a:r>
+          </a:p>
+          <a:p>
+            <a:pPr marL="0" marR="0" lvl="0" indent="0" algn="l" defTabSz="914400" rtl="0" eaLnBrk="0" fontAlgn="base" latinLnBrk="0" hangingPunct="0">
+              <a:lnSpc>
+                <a:spcPct val="100000"/>
+              </a:lnSpc>
+              <a:spcBef>
+                <a:spcPct val="0"/>
+              </a:spcBef>
+              <a:spcAft>
+                <a:spcPct val="0"/>
+              </a:spcAft>
+              <a:buClrTx/>
+              <a:buSzTx/>
+              <a:buFontTx/>
               <a:buChar char="•"/>
-            </a:pPr>
-            <a:r>
-              <a:rPr lang="fr-FR" sz="2400" dirty="0" smtClean="0"/>
-              <a:t>Directement dans le code </a:t>
-            </a:r>
-            <a:r>
-              <a:rPr lang="fr-FR" sz="2400" dirty="0" err="1" smtClean="0"/>
-              <a:t>php</a:t>
-            </a:r>
-            <a:endParaRPr lang="fr-FR" sz="2400" dirty="0"/>
-          </a:p>
-          <a:p>
-            <a:pPr marL="1257300" lvl="2" indent="-342900">
-              <a:buFont typeface="Arial" panose="020B0604020202020204" pitchFamily="34" charset="0"/>
-              <a:buChar char="•"/>
-            </a:pPr>
-            <a:r>
-              <a:rPr lang="en-US" dirty="0" err="1"/>
-              <a:t>ini_set</a:t>
-            </a:r>
-            <a:r>
-              <a:rPr lang="en-US" dirty="0"/>
-              <a:t>('</a:t>
-            </a:r>
-            <a:r>
-              <a:rPr lang="en-US" dirty="0" err="1"/>
-              <a:t>display_errors</a:t>
-            </a:r>
-            <a:r>
-              <a:rPr lang="en-US" dirty="0"/>
-              <a:t>', 1); </a:t>
-            </a:r>
-            <a:endParaRPr lang="en-US" dirty="0" smtClean="0"/>
-          </a:p>
-          <a:p>
-            <a:pPr marL="1257300" lvl="2" indent="-342900">
-              <a:buFont typeface="Arial" panose="020B0604020202020204" pitchFamily="34" charset="0"/>
-              <a:buChar char="•"/>
-            </a:pPr>
-            <a:r>
-              <a:rPr lang="en-US" dirty="0" err="1" smtClean="0"/>
-              <a:t>ini_set</a:t>
-            </a:r>
-            <a:r>
-              <a:rPr lang="en-US" dirty="0"/>
-              <a:t>('</a:t>
-            </a:r>
-            <a:r>
-              <a:rPr lang="en-US" dirty="0" err="1"/>
-              <a:t>display_startup_errors</a:t>
-            </a:r>
-            <a:r>
-              <a:rPr lang="en-US" dirty="0"/>
-              <a:t>', 1); </a:t>
-            </a:r>
-            <a:endParaRPr lang="en-US" dirty="0" smtClean="0"/>
-          </a:p>
-          <a:p>
-            <a:pPr marL="1257300" lvl="2" indent="-342900">
-              <a:buFont typeface="Arial" panose="020B0604020202020204" pitchFamily="34" charset="0"/>
-              <a:buChar char="•"/>
-            </a:pPr>
-            <a:r>
-              <a:rPr lang="en-US" dirty="0" err="1" smtClean="0"/>
-              <a:t>error_reporting</a:t>
-            </a:r>
-            <a:r>
-              <a:rPr lang="en-US" dirty="0" smtClean="0"/>
-              <a:t>(E_ALL);</a:t>
-            </a:r>
-          </a:p>
-          <a:p>
-            <a:pPr marL="800100" lvl="1" indent="-342900">
-              <a:buFont typeface="Arial" panose="020B0604020202020204" pitchFamily="34" charset="0"/>
-              <a:buChar char="•"/>
-            </a:pPr>
-            <a:r>
-              <a:rPr lang="en-US" sz="2400" dirty="0" err="1" smtClean="0"/>
-              <a:t>Dans</a:t>
-            </a:r>
-            <a:r>
-              <a:rPr lang="en-US" sz="2400" dirty="0" smtClean="0"/>
-              <a:t> le php.ini</a:t>
-            </a:r>
-          </a:p>
-          <a:p>
-            <a:pPr marL="800100" lvl="1" indent="-342900">
-              <a:buFont typeface="Arial" panose="020B0604020202020204" pitchFamily="34" charset="0"/>
-              <a:buChar char="•"/>
-            </a:pPr>
-            <a:r>
-              <a:rPr lang="en-US" sz="2400" dirty="0" err="1" smtClean="0"/>
-              <a:t>En</a:t>
-            </a:r>
-            <a:r>
-              <a:rPr lang="en-US" sz="2400" dirty="0"/>
-              <a:t> direct </a:t>
-            </a:r>
-            <a:r>
-              <a:rPr lang="en-US" sz="2400" dirty="0" err="1"/>
-              <a:t>php</a:t>
-            </a:r>
-            <a:r>
-              <a:rPr lang="en-US" sz="2400" dirty="0"/>
-              <a:t> -S localhost:8000 -</a:t>
-            </a:r>
-            <a:r>
-              <a:rPr lang="en-US" sz="2400" dirty="0" err="1" smtClean="0"/>
-              <a:t>ddisplay_errors</a:t>
-            </a:r>
-            <a:r>
-              <a:rPr lang="en-US" sz="2400" dirty="0" smtClean="0"/>
-              <a:t>=1</a:t>
-            </a:r>
-          </a:p>
-          <a:p>
-            <a:pPr lvl="1"/>
-            <a:endParaRPr lang="en-US" sz="2400" dirty="0" smtClean="0"/>
-          </a:p>
-          <a:p>
-            <a:pPr lvl="1"/>
-            <a:endParaRPr lang="fr-FR" sz="2400" dirty="0"/>
-          </a:p>
-          <a:p>
-            <a:endParaRPr lang="fr-FR" sz="2400" b="1" dirty="0" smtClean="0">
+              <a:tabLst/>
+            </a:pPr>
+            <a:r>
+              <a:rPr kumimoji="0" lang="fr-FR" altLang="fr-FR" b="0" i="0" u="none" strike="noStrike" cap="none" normalizeH="0" baseline="0" dirty="0" smtClean="0">
+                <a:ln>
+                  <a:noFill/>
+                </a:ln>
+                <a:solidFill>
+                  <a:srgbClr val="525252"/>
+                </a:solidFill>
+                <a:effectLst/>
+                <a:latin typeface="Arial" panose="020B0604020202020204" pitchFamily="34" charset="0"/>
+                <a:cs typeface="Arial" panose="020B0604020202020204" pitchFamily="34" charset="0"/>
+              </a:rPr>
+              <a:t>PSR-3 : qui s’occupe de l’interface des </a:t>
+            </a:r>
+            <a:r>
+              <a:rPr kumimoji="0" lang="fr-FR" altLang="fr-FR" b="0" i="0" u="none" strike="noStrike" cap="none" normalizeH="0" baseline="0" dirty="0" err="1" smtClean="0">
+                <a:ln>
+                  <a:noFill/>
+                </a:ln>
+                <a:solidFill>
+                  <a:srgbClr val="525252"/>
+                </a:solidFill>
+                <a:effectLst/>
+                <a:latin typeface="Arial" panose="020B0604020202020204" pitchFamily="34" charset="0"/>
+                <a:cs typeface="Arial" panose="020B0604020202020204" pitchFamily="34" charset="0"/>
+              </a:rPr>
+              <a:t>loggers</a:t>
+            </a:r>
+            <a:r>
+              <a:rPr kumimoji="0" lang="fr-FR" altLang="fr-FR" b="0" i="0" u="none" strike="noStrike" cap="none" normalizeH="0" baseline="0" dirty="0" smtClean="0">
+                <a:ln>
+                  <a:noFill/>
+                </a:ln>
+                <a:solidFill>
+                  <a:srgbClr val="525252"/>
+                </a:solidFill>
+                <a:effectLst/>
+                <a:latin typeface="Arial" panose="020B0604020202020204" pitchFamily="34" charset="0"/>
+                <a:cs typeface="Arial" panose="020B0604020202020204" pitchFamily="34" charset="0"/>
+              </a:rPr>
+              <a:t>.</a:t>
+            </a:r>
+          </a:p>
+          <a:p>
+            <a:pPr marL="0" marR="0" lvl="0" indent="0" algn="l" defTabSz="914400" rtl="0" eaLnBrk="0" fontAlgn="base" latinLnBrk="0" hangingPunct="0">
+              <a:lnSpc>
+                <a:spcPct val="100000"/>
+              </a:lnSpc>
+              <a:spcBef>
+                <a:spcPct val="0"/>
+              </a:spcBef>
+              <a:spcAft>
+                <a:spcPct val="0"/>
+              </a:spcAft>
+              <a:buClrTx/>
+              <a:buSzTx/>
+              <a:buFontTx/>
+              <a:buNone/>
+              <a:tabLst/>
+            </a:pPr>
+            <a:endParaRPr kumimoji="0" lang="fr-FR" altLang="fr-FR" sz="2800" b="0" i="0" u="none" strike="noStrike" cap="none" normalizeH="0" baseline="0" dirty="0" smtClean="0">
+              <a:ln>
+                <a:noFill/>
+              </a:ln>
               <a:solidFill>
-                <a:srgbClr val="C00000"/>
+                <a:schemeClr val="tx1"/>
               </a:solidFill>
+              <a:effectLst/>
+              <a:latin typeface="Arial" panose="020B0604020202020204" pitchFamily="34" charset="0"/>
             </a:endParaRPr>
           </a:p>
         </p:txBody>
@@ -16039,7 +16531,7 @@
     </p:spTree>
     <p:extLst>
       <p:ext uri="{BB962C8B-B14F-4D97-AF65-F5344CB8AC3E}">
-        <p14:creationId xmlns:p14="http://schemas.microsoft.com/office/powerpoint/2010/main" val="367666681"/>
+        <p14:creationId xmlns:p14="http://schemas.microsoft.com/office/powerpoint/2010/main" val="2652879569"/>
       </p:ext>
     </p:extLst>
   </p:cSld>
@@ -16113,7 +16605,7 @@
                   <a:srgbClr val="C00000"/>
                 </a:solidFill>
               </a:rPr>
-              <a:t>Erreurs fréquentes</a:t>
+              <a:t>La configuration</a:t>
             </a:r>
             <a:endParaRPr lang="fr-FR" sz="2700" b="1" dirty="0">
               <a:solidFill>
@@ -16246,7 +16738,7 @@
               <a:pPr>
                 <a:defRPr/>
               </a:pPr>
-              <a:t>01:43:13</a:t>
+              <a:t>08:32:32</a:t>
             </a:fld>
             <a:endParaRPr lang="fr-FR" dirty="0"/>
           </a:p>
@@ -16261,7 +16753,7 @@
         <p:spPr>
           <a:xfrm>
             <a:off x="609258" y="1274640"/>
-            <a:ext cx="10985500" cy="2062103"/>
+            <a:ext cx="10985500" cy="4247317"/>
           </a:xfrm>
           <a:prstGeom prst="rect">
             <a:avLst/>
@@ -16273,13 +16765,124 @@
           </a:bodyPr>
           <a:lstStyle/>
           <a:p>
+            <a:pPr marL="342900" indent="-342900">
+              <a:buFont typeface="Arial" panose="020B0604020202020204" pitchFamily="34" charset="0"/>
+              <a:buChar char="•"/>
+            </a:pPr>
+            <a:r>
+              <a:rPr lang="fr-FR" sz="2400" dirty="0" smtClean="0"/>
+              <a:t>La configuration php.ini</a:t>
+            </a:r>
+          </a:p>
+          <a:p>
+            <a:pPr marL="342900" indent="-342900">
+              <a:buFont typeface="Arial" panose="020B0604020202020204" pitchFamily="34" charset="0"/>
+              <a:buChar char="•"/>
+            </a:pPr>
+            <a:r>
+              <a:rPr lang="fr-FR" sz="2400" dirty="0" smtClean="0"/>
+              <a:t>Afficher la page de configuration de </a:t>
+            </a:r>
+            <a:r>
+              <a:rPr lang="fr-FR" sz="2400" dirty="0" err="1" smtClean="0"/>
+              <a:t>php</a:t>
+            </a:r>
+            <a:r>
+              <a:rPr lang="fr-FR" sz="2400" dirty="0" smtClean="0"/>
+              <a:t> via </a:t>
+            </a:r>
+            <a:r>
+              <a:rPr lang="fr-FR" sz="2400" dirty="0" err="1" smtClean="0"/>
+              <a:t>phpinfo</a:t>
+            </a:r>
+            <a:r>
+              <a:rPr lang="fr-FR" sz="2400" dirty="0" smtClean="0"/>
+              <a:t>()</a:t>
+            </a:r>
+          </a:p>
+          <a:p>
+            <a:pPr marL="342900" indent="-342900">
+              <a:buFont typeface="Arial" panose="020B0604020202020204" pitchFamily="34" charset="0"/>
+              <a:buChar char="•"/>
+            </a:pPr>
+            <a:r>
+              <a:rPr lang="fr-FR" sz="2400" dirty="0" smtClean="0"/>
+              <a:t>Afficher ou masquer les erreurs</a:t>
+            </a:r>
+          </a:p>
+          <a:p>
             <a:pPr marL="800100" lvl="1" indent="-342900">
               <a:buFont typeface="Arial" panose="020B0604020202020204" pitchFamily="34" charset="0"/>
               <a:buChar char="•"/>
             </a:pPr>
             <a:r>
-              <a:rPr lang="en-US" sz="3200" b="1" dirty="0"/>
-              <a:t>PHP - Parse error, unexpected T_STRING, expecting ',' or ';'</a:t>
+              <a:rPr lang="fr-FR" sz="2400" dirty="0" smtClean="0"/>
+              <a:t>Directement dans le code </a:t>
+            </a:r>
+            <a:r>
+              <a:rPr lang="fr-FR" sz="2400" dirty="0" err="1" smtClean="0"/>
+              <a:t>php</a:t>
+            </a:r>
+            <a:endParaRPr lang="fr-FR" sz="2400" dirty="0"/>
+          </a:p>
+          <a:p>
+            <a:pPr marL="1257300" lvl="2" indent="-342900">
+              <a:buFont typeface="Arial" panose="020B0604020202020204" pitchFamily="34" charset="0"/>
+              <a:buChar char="•"/>
+            </a:pPr>
+            <a:r>
+              <a:rPr lang="en-US" dirty="0" err="1"/>
+              <a:t>ini_set</a:t>
+            </a:r>
+            <a:r>
+              <a:rPr lang="en-US" dirty="0"/>
+              <a:t>('</a:t>
+            </a:r>
+            <a:r>
+              <a:rPr lang="en-US" dirty="0" err="1"/>
+              <a:t>display_errors</a:t>
+            </a:r>
+            <a:r>
+              <a:rPr lang="en-US" dirty="0"/>
+              <a:t>', 1); </a:t>
+            </a:r>
+            <a:endParaRPr lang="en-US" dirty="0" smtClean="0"/>
+          </a:p>
+          <a:p>
+            <a:pPr marL="1257300" lvl="2" indent="-342900">
+              <a:buFont typeface="Arial" panose="020B0604020202020204" pitchFamily="34" charset="0"/>
+              <a:buChar char="•"/>
+            </a:pPr>
+            <a:r>
+              <a:rPr lang="en-US" dirty="0" err="1" smtClean="0"/>
+              <a:t>ini_set</a:t>
+            </a:r>
+            <a:r>
+              <a:rPr lang="en-US" dirty="0"/>
+              <a:t>('</a:t>
+            </a:r>
+            <a:r>
+              <a:rPr lang="en-US" dirty="0" err="1"/>
+              <a:t>display_startup_errors</a:t>
+            </a:r>
+            <a:r>
+              <a:rPr lang="en-US" dirty="0"/>
+              <a:t>', 1); </a:t>
+            </a:r>
+            <a:endParaRPr lang="en-US" dirty="0" smtClean="0"/>
+          </a:p>
+          <a:p>
+            <a:pPr marL="1257300" lvl="2" indent="-342900">
+              <a:buFont typeface="Arial" panose="020B0604020202020204" pitchFamily="34" charset="0"/>
+              <a:buChar char="•"/>
+            </a:pPr>
+            <a:r>
+              <a:rPr lang="en-US" dirty="0" err="1" smtClean="0"/>
+              <a:t>error_reporting</a:t>
+            </a:r>
+            <a:r>
+              <a:rPr lang="en-US" dirty="0" smtClean="0"/>
+              <a:t>(E_ALL);</a:t>
             </a:r>
           </a:p>
           <a:p>
@@ -16287,27 +16890,51 @@
               <a:buFont typeface="Arial" panose="020B0604020202020204" pitchFamily="34" charset="0"/>
               <a:buChar char="•"/>
             </a:pPr>
-            <a:endParaRPr lang="en-US" sz="2400" dirty="0" smtClean="0"/>
-          </a:p>
-          <a:p>
-            <a:pPr marL="1257300" lvl="2" indent="-342900">
+            <a:r>
+              <a:rPr lang="en-US" sz="2400" dirty="0" err="1" smtClean="0"/>
+              <a:t>Dans</a:t>
+            </a:r>
+            <a:r>
+              <a:rPr lang="en-US" sz="2400" dirty="0" smtClean="0"/>
+              <a:t> le php.ini</a:t>
+            </a:r>
+          </a:p>
+          <a:p>
+            <a:pPr marL="800100" lvl="1" indent="-342900">
               <a:buFont typeface="Arial" panose="020B0604020202020204" pitchFamily="34" charset="0"/>
               <a:buChar char="•"/>
             </a:pPr>
             <a:r>
-              <a:rPr lang="fr-FR" sz="2400" dirty="0" smtClean="0"/>
-              <a:t>Exemple avec ;</a:t>
-            </a:r>
-          </a:p>
-          <a:p>
-            <a:pPr marL="1257300" lvl="2" indent="-342900">
-              <a:buFont typeface="Arial" panose="020B0604020202020204" pitchFamily="34" charset="0"/>
-              <a:buChar char="•"/>
-            </a:pPr>
-            <a:r>
-              <a:rPr lang="fr-FR" sz="2400" dirty="0" smtClean="0"/>
-              <a:t>Exemple avec {</a:t>
-            </a:r>
+              <a:rPr lang="en-US" sz="2400" dirty="0" err="1" smtClean="0"/>
+              <a:t>En</a:t>
+            </a:r>
+            <a:r>
+              <a:rPr lang="en-US" sz="2400" dirty="0"/>
+              <a:t> direct </a:t>
+            </a:r>
+            <a:r>
+              <a:rPr lang="en-US" sz="2400" dirty="0" err="1"/>
+              <a:t>php</a:t>
+            </a:r>
+            <a:r>
+              <a:rPr lang="en-US" sz="2400" dirty="0"/>
+              <a:t> -S localhost:8000 -</a:t>
+            </a:r>
+            <a:r>
+              <a:rPr lang="en-US" sz="2400" dirty="0" err="1" smtClean="0"/>
+              <a:t>ddisplay_errors</a:t>
+            </a:r>
+            <a:r>
+              <a:rPr lang="en-US" sz="2400" dirty="0" smtClean="0"/>
+              <a:t>=1</a:t>
+            </a:r>
+          </a:p>
+          <a:p>
+            <a:pPr lvl="1"/>
+            <a:endParaRPr lang="en-US" sz="2400" dirty="0" smtClean="0"/>
+          </a:p>
+          <a:p>
+            <a:pPr lvl="1"/>
             <a:endParaRPr lang="fr-FR" sz="2400" dirty="0"/>
           </a:p>
           <a:p>
@@ -16322,7 +16949,7 @@
     </p:spTree>
     <p:extLst>
       <p:ext uri="{BB962C8B-B14F-4D97-AF65-F5344CB8AC3E}">
-        <p14:creationId xmlns:p14="http://schemas.microsoft.com/office/powerpoint/2010/main" val="4248557721"/>
+        <p14:creationId xmlns:p14="http://schemas.microsoft.com/office/powerpoint/2010/main" val="367666681"/>
       </p:ext>
     </p:extLst>
   </p:cSld>
@@ -16434,15 +17061,7 @@
                   <a:srgbClr val="991F3D"/>
                 </a:solidFill>
               </a:rPr>
-              <a:t>C’est quoi PHP </a:t>
-            </a:r>
-            <a:r>
-              <a:rPr lang="fr-FR" sz="3200" b="1" dirty="0" smtClean="0">
-                <a:solidFill>
-                  <a:srgbClr val="991F3D"/>
-                </a:solidFill>
-              </a:rPr>
-              <a:t>?</a:t>
+              <a:t>C’est quoi PHP ?</a:t>
             </a:r>
           </a:p>
           <a:p>
@@ -16458,11 +17077,6 @@
               </a:rPr>
               <a:t>Quelles sont vos connaissances ?</a:t>
             </a:r>
-            <a:endParaRPr lang="fr-FR" sz="1600" dirty="0" smtClean="0">
-              <a:solidFill>
-                <a:srgbClr val="991F3D"/>
-              </a:solidFill>
-            </a:endParaRPr>
           </a:p>
           <a:p>
             <a:pPr marL="798513" lvl="1" indent="-341313">
@@ -16566,7 +17180,6 @@
               <a:rPr lang="fr-FR" sz="2800" b="1" dirty="0" smtClean="0"/>
               <a:t>Débuguer son code</a:t>
             </a:r>
-            <a:endParaRPr lang="fr-FR" sz="2800" b="1" dirty="0" smtClean="0"/>
           </a:p>
           <a:p>
             <a:pPr marL="798513" lvl="1" indent="-341313">
@@ -16577,7 +17190,6 @@
               <a:rPr lang="fr-FR" sz="1400" dirty="0" smtClean="0"/>
               <a:t>Voir ses erreurs</a:t>
             </a:r>
-            <a:endParaRPr lang="fr-FR" sz="1400" dirty="0" smtClean="0"/>
           </a:p>
           <a:p>
             <a:pPr marL="798513" lvl="1" indent="-341313">
@@ -16588,7 +17200,6 @@
               <a:rPr lang="fr-FR" sz="1400" dirty="0" smtClean="0"/>
               <a:t>Les erreurs classiques</a:t>
             </a:r>
-            <a:endParaRPr lang="fr-FR" sz="1400" dirty="0" smtClean="0"/>
           </a:p>
           <a:p>
             <a:pPr marL="798513" lvl="1" indent="-341313">
@@ -17046,7 +17657,7 @@
               <a:pPr>
                 <a:defRPr/>
               </a:pPr>
-              <a:t>01:44:17</a:t>
+              <a:t>08:32:32</a:t>
             </a:fld>
             <a:endParaRPr lang="fr-FR" dirty="0"/>
           </a:p>
@@ -17061,7 +17672,7 @@
         <p:spPr>
           <a:xfrm>
             <a:off x="609258" y="1274640"/>
-            <a:ext cx="10985500" cy="1938992"/>
+            <a:ext cx="10985500" cy="2062103"/>
           </a:xfrm>
           <a:prstGeom prst="rect">
             <a:avLst/>
@@ -17079,17 +17690,36 @@
             </a:pPr>
             <a:r>
               <a:rPr lang="en-US" sz="3200" b="1" dirty="0"/>
-              <a:t>Warning: Cannot modify header information - headers already sent by (output started at /some/file.php:12) in /some/</a:t>
-            </a:r>
-            <a:r>
-              <a:rPr lang="en-US" sz="3200" b="1" dirty="0" err="1"/>
-              <a:t>file.php</a:t>
-            </a:r>
-            <a:r>
-              <a:rPr lang="en-US" sz="3200" b="1" dirty="0"/>
-              <a:t> on line 23</a:t>
-            </a:r>
-            <a:endParaRPr lang="en-US" sz="4000" b="1" dirty="0" smtClean="0"/>
+              <a:t>PHP - Parse error, unexpected T_STRING, expecting ',' or ';'</a:t>
+            </a:r>
+          </a:p>
+          <a:p>
+            <a:pPr marL="800100" lvl="1" indent="-342900">
+              <a:buFont typeface="Arial" panose="020B0604020202020204" pitchFamily="34" charset="0"/>
+              <a:buChar char="•"/>
+            </a:pPr>
+            <a:endParaRPr lang="en-US" sz="2400" dirty="0" smtClean="0"/>
+          </a:p>
+          <a:p>
+            <a:pPr marL="1257300" lvl="2" indent="-342900">
+              <a:buFont typeface="Arial" panose="020B0604020202020204" pitchFamily="34" charset="0"/>
+              <a:buChar char="•"/>
+            </a:pPr>
+            <a:r>
+              <a:rPr lang="fr-FR" sz="2400" dirty="0" smtClean="0"/>
+              <a:t>Exemple avec ;</a:t>
+            </a:r>
+          </a:p>
+          <a:p>
+            <a:pPr marL="1257300" lvl="2" indent="-342900">
+              <a:buFont typeface="Arial" panose="020B0604020202020204" pitchFamily="34" charset="0"/>
+              <a:buChar char="•"/>
+            </a:pPr>
+            <a:r>
+              <a:rPr lang="fr-FR" sz="2400" dirty="0" smtClean="0"/>
+              <a:t>Exemple avec {</a:t>
+            </a:r>
+            <a:endParaRPr lang="fr-FR" sz="2400" dirty="0"/>
           </a:p>
           <a:p>
             <a:endParaRPr lang="fr-FR" sz="2400" b="1" dirty="0" smtClean="0">
@@ -17103,7 +17733,7 @@
     </p:spTree>
     <p:extLst>
       <p:ext uri="{BB962C8B-B14F-4D97-AF65-F5344CB8AC3E}">
-        <p14:creationId xmlns:p14="http://schemas.microsoft.com/office/powerpoint/2010/main" val="654900061"/>
+        <p14:creationId xmlns:p14="http://schemas.microsoft.com/office/powerpoint/2010/main" val="4248557721"/>
       </p:ext>
     </p:extLst>
   </p:cSld>
@@ -17310,7 +17940,7 @@
               <a:pPr>
                 <a:defRPr/>
               </a:pPr>
-              <a:t>01:47:27</a:t>
+              <a:t>08:32:32</a:t>
             </a:fld>
             <a:endParaRPr lang="fr-FR" dirty="0"/>
           </a:p>
@@ -17325,7 +17955,7 @@
         <p:spPr>
           <a:xfrm>
             <a:off x="609258" y="1274640"/>
-            <a:ext cx="10985500" cy="1077218"/>
+            <a:ext cx="10985500" cy="1938992"/>
           </a:xfrm>
           <a:prstGeom prst="rect">
             <a:avLst/>
@@ -17343,259 +17973,19 @@
             </a:pPr>
             <a:r>
               <a:rPr lang="en-US" sz="3200" b="1" dirty="0"/>
-              <a:t>Notice: Undefined index: </a:t>
+              <a:t>Warning: Cannot modify header information - headers already sent by (output started at /some/file.php:12) in /some/</a:t>
             </a:r>
             <a:r>
               <a:rPr lang="en-US" sz="3200" b="1" dirty="0" err="1"/>
-              <a:t>productid</a:t>
+              <a:t>file.php</a:t>
             </a:r>
             <a:r>
               <a:rPr lang="en-US" sz="3200" b="1" dirty="0"/>
-              <a:t> in /</a:t>
-            </a:r>
-            <a:r>
-              <a:rPr lang="en-US" sz="3200" b="1" dirty="0" err="1"/>
-              <a:t>var</a:t>
-            </a:r>
-            <a:r>
-              <a:rPr lang="en-US" sz="3200" b="1" dirty="0"/>
-              <a:t>/www/test/</a:t>
-            </a:r>
-            <a:r>
-              <a:rPr lang="en-US" sz="3200" b="1" dirty="0" err="1"/>
-              <a:t>modifyform.php</a:t>
-            </a:r>
-            <a:r>
-              <a:rPr lang="en-US" sz="3200" b="1" dirty="0"/>
-              <a:t> on line 32</a:t>
-            </a:r>
-            <a:endParaRPr lang="fr-FR" sz="4000" b="1" dirty="0" smtClean="0">
-              <a:solidFill>
-                <a:srgbClr val="C00000"/>
-              </a:solidFill>
-            </a:endParaRPr>
-          </a:p>
-        </p:txBody>
-      </p:sp>
-      <p:sp>
-        <p:nvSpPr>
-          <p:cNvPr id="6" name="Rectangle 5"/>
-          <p:cNvSpPr/>
-          <p:nvPr/>
-        </p:nvSpPr>
-        <p:spPr>
-          <a:xfrm>
-            <a:off x="609258" y="2784353"/>
-            <a:ext cx="10985500" cy="3293209"/>
-          </a:xfrm>
-          <a:prstGeom prst="rect">
-            <a:avLst/>
-          </a:prstGeom>
-        </p:spPr>
-        <p:txBody>
-          <a:bodyPr wrap="square">
-            <a:spAutoFit/>
-          </a:bodyPr>
-          <a:lstStyle/>
-          <a:p>
-            <a:pPr marL="800100" lvl="1" indent="-342900">
-              <a:buFont typeface="Arial" panose="020B0604020202020204" pitchFamily="34" charset="0"/>
-              <a:buChar char="•"/>
-            </a:pPr>
-            <a:r>
-              <a:rPr lang="en-US" sz="3200" dirty="0" err="1" smtClean="0"/>
-              <a:t>Création</a:t>
-            </a:r>
-            <a:r>
-              <a:rPr lang="en-US" sz="3200" dirty="0" smtClean="0"/>
-              <a:t> function de </a:t>
-            </a:r>
-            <a:r>
-              <a:rPr lang="en-US" sz="3200" dirty="0" err="1" smtClean="0"/>
-              <a:t>débuggage</a:t>
-            </a:r>
-            <a:endParaRPr lang="en-US" sz="3200" dirty="0" smtClean="0"/>
-          </a:p>
-          <a:p>
-            <a:pPr marL="800100" lvl="1" indent="-342900">
-              <a:buFont typeface="Arial" panose="020B0604020202020204" pitchFamily="34" charset="0"/>
-              <a:buChar char="•"/>
-            </a:pPr>
-            <a:endParaRPr lang="en-US" sz="3200" b="1" dirty="0">
-              <a:solidFill>
-                <a:srgbClr val="C00000"/>
-              </a:solidFill>
-            </a:endParaRPr>
-          </a:p>
-          <a:p>
-            <a:pPr lvl="1"/>
-            <a:r>
-              <a:rPr lang="fr-FR" sz="2400" b="1" dirty="0" err="1">
-                <a:solidFill>
-                  <a:srgbClr val="C00000"/>
-                </a:solidFill>
-              </a:rPr>
-              <a:t>function</a:t>
-            </a:r>
-            <a:r>
-              <a:rPr lang="fr-FR" sz="2400" b="1" dirty="0">
-                <a:solidFill>
-                  <a:srgbClr val="C00000"/>
-                </a:solidFill>
-              </a:rPr>
-              <a:t> </a:t>
-            </a:r>
-            <a:r>
-              <a:rPr lang="fr-FR" sz="2400" b="1" dirty="0" err="1">
-                <a:solidFill>
-                  <a:srgbClr val="C00000"/>
-                </a:solidFill>
-              </a:rPr>
-              <a:t>mydebug</a:t>
-            </a:r>
-            <a:r>
-              <a:rPr lang="fr-FR" sz="2400" b="1" dirty="0">
-                <a:solidFill>
-                  <a:srgbClr val="C00000"/>
-                </a:solidFill>
-              </a:rPr>
-              <a:t>($variable) {</a:t>
-            </a:r>
-          </a:p>
-          <a:p>
-            <a:pPr lvl="1"/>
-            <a:r>
-              <a:rPr lang="fr-FR" sz="2400" b="1" dirty="0">
-                <a:solidFill>
-                  <a:srgbClr val="C00000"/>
-                </a:solidFill>
-              </a:rPr>
-              <a:t>  </a:t>
-            </a:r>
-            <a:r>
-              <a:rPr lang="fr-FR" sz="2400" b="1" dirty="0" err="1">
-                <a:solidFill>
-                  <a:srgbClr val="C00000"/>
-                </a:solidFill>
-              </a:rPr>
-              <a:t>echo</a:t>
-            </a:r>
-            <a:r>
-              <a:rPr lang="fr-FR" sz="2400" b="1" dirty="0">
-                <a:solidFill>
-                  <a:srgbClr val="C00000"/>
-                </a:solidFill>
-              </a:rPr>
-              <a:t> '&lt;</a:t>
-            </a:r>
-            <a:r>
-              <a:rPr lang="fr-FR" sz="2400" b="1" dirty="0" err="1">
-                <a:solidFill>
-                  <a:srgbClr val="C00000"/>
-                </a:solidFill>
-              </a:rPr>
-              <a:t>pre</a:t>
-            </a:r>
-            <a:r>
-              <a:rPr lang="fr-FR" sz="2400" b="1" dirty="0">
-                <a:solidFill>
-                  <a:srgbClr val="C00000"/>
-                </a:solidFill>
-              </a:rPr>
-              <a:t>&gt;';</a:t>
-            </a:r>
-          </a:p>
-          <a:p>
-            <a:pPr lvl="1"/>
-            <a:r>
-              <a:rPr lang="fr-FR" sz="2400" b="1" dirty="0">
-                <a:solidFill>
-                  <a:srgbClr val="C00000"/>
-                </a:solidFill>
-              </a:rPr>
-              <a:t>  </a:t>
-            </a:r>
-            <a:r>
-              <a:rPr lang="fr-FR" sz="2400" b="1" dirty="0" err="1">
-                <a:solidFill>
-                  <a:srgbClr val="C00000"/>
-                </a:solidFill>
-              </a:rPr>
-              <a:t>var_dump</a:t>
-            </a:r>
-            <a:r>
-              <a:rPr lang="fr-FR" sz="2400" b="1" dirty="0">
-                <a:solidFill>
-                  <a:srgbClr val="C00000"/>
-                </a:solidFill>
-              </a:rPr>
-              <a:t>($variable);</a:t>
-            </a:r>
-          </a:p>
-          <a:p>
-            <a:pPr lvl="1"/>
-            <a:r>
-              <a:rPr lang="fr-FR" sz="2400" b="1" dirty="0">
-                <a:solidFill>
-                  <a:srgbClr val="C00000"/>
-                </a:solidFill>
-              </a:rPr>
-              <a:t>  </a:t>
-            </a:r>
-            <a:r>
-              <a:rPr lang="fr-FR" sz="2400" b="1" dirty="0" err="1">
-                <a:solidFill>
-                  <a:srgbClr val="C00000"/>
-                </a:solidFill>
-              </a:rPr>
-              <a:t>echo</a:t>
-            </a:r>
-            <a:r>
-              <a:rPr lang="fr-FR" sz="2400" b="1" dirty="0">
-                <a:solidFill>
-                  <a:srgbClr val="C00000"/>
-                </a:solidFill>
-              </a:rPr>
-              <a:t> '&lt;/</a:t>
-            </a:r>
-            <a:r>
-              <a:rPr lang="fr-FR" sz="2400" b="1" dirty="0" err="1">
-                <a:solidFill>
-                  <a:srgbClr val="C00000"/>
-                </a:solidFill>
-              </a:rPr>
-              <a:t>pre</a:t>
-            </a:r>
-            <a:r>
-              <a:rPr lang="fr-FR" sz="2400" b="1" dirty="0">
-                <a:solidFill>
-                  <a:srgbClr val="C00000"/>
-                </a:solidFill>
-              </a:rPr>
-              <a:t>&gt;';</a:t>
-            </a:r>
-          </a:p>
-          <a:p>
-            <a:pPr lvl="1"/>
-            <a:r>
-              <a:rPr lang="fr-FR" sz="2400" b="1" dirty="0">
-                <a:solidFill>
-                  <a:srgbClr val="C00000"/>
-                </a:solidFill>
-              </a:rPr>
-              <a:t>  die();</a:t>
-            </a:r>
-          </a:p>
-          <a:p>
-            <a:pPr lvl="1"/>
-            <a:r>
-              <a:rPr lang="fr-FR" sz="2400" b="1" dirty="0">
-                <a:solidFill>
-                  <a:srgbClr val="C00000"/>
-                </a:solidFill>
-              </a:rPr>
-              <a:t>}</a:t>
-            </a:r>
+              <a:t> on line 23</a:t>
+            </a:r>
+            <a:endParaRPr lang="en-US" sz="4000" b="1" dirty="0" smtClean="0"/>
+          </a:p>
+          <a:p>
             <a:endParaRPr lang="fr-FR" sz="2400" b="1" dirty="0" smtClean="0">
               <a:solidFill>
                 <a:srgbClr val="C00000"/>
@@ -17607,7 +17997,7 @@
     </p:spTree>
     <p:extLst>
       <p:ext uri="{BB962C8B-B14F-4D97-AF65-F5344CB8AC3E}">
-        <p14:creationId xmlns:p14="http://schemas.microsoft.com/office/powerpoint/2010/main" val="1926075758"/>
+        <p14:creationId xmlns:p14="http://schemas.microsoft.com/office/powerpoint/2010/main" val="654900061"/>
       </p:ext>
     </p:extLst>
   </p:cSld>
@@ -17814,7 +18204,511 @@
               <a:pPr>
                 <a:defRPr/>
               </a:pPr>
-              <a:t>01:48:18</a:t>
+              <a:t>08:32:32</a:t>
+            </a:fld>
+            <a:endParaRPr lang="fr-FR" dirty="0"/>
+          </a:p>
+        </p:txBody>
+      </p:sp>
+      <p:sp>
+        <p:nvSpPr>
+          <p:cNvPr id="2" name="Rectangle 1"/>
+          <p:cNvSpPr/>
+          <p:nvPr/>
+        </p:nvSpPr>
+        <p:spPr>
+          <a:xfrm>
+            <a:off x="609258" y="1274640"/>
+            <a:ext cx="10985500" cy="1077218"/>
+          </a:xfrm>
+          <a:prstGeom prst="rect">
+            <a:avLst/>
+          </a:prstGeom>
+        </p:spPr>
+        <p:txBody>
+          <a:bodyPr wrap="square">
+            <a:spAutoFit/>
+          </a:bodyPr>
+          <a:lstStyle/>
+          <a:p>
+            <a:pPr marL="800100" lvl="1" indent="-342900">
+              <a:buFont typeface="Arial" panose="020B0604020202020204" pitchFamily="34" charset="0"/>
+              <a:buChar char="•"/>
+            </a:pPr>
+            <a:r>
+              <a:rPr lang="en-US" sz="3200" b="1" dirty="0"/>
+              <a:t>Notice: Undefined index: </a:t>
+            </a:r>
+            <a:r>
+              <a:rPr lang="en-US" sz="3200" b="1" dirty="0" err="1"/>
+              <a:t>productid</a:t>
+            </a:r>
+            <a:r>
+              <a:rPr lang="en-US" sz="3200" b="1" dirty="0"/>
+              <a:t> in /</a:t>
+            </a:r>
+            <a:r>
+              <a:rPr lang="en-US" sz="3200" b="1" dirty="0" err="1"/>
+              <a:t>var</a:t>
+            </a:r>
+            <a:r>
+              <a:rPr lang="en-US" sz="3200" b="1" dirty="0"/>
+              <a:t>/www/test/</a:t>
+            </a:r>
+            <a:r>
+              <a:rPr lang="en-US" sz="3200" b="1" dirty="0" err="1"/>
+              <a:t>modifyform.php</a:t>
+            </a:r>
+            <a:r>
+              <a:rPr lang="en-US" sz="3200" b="1" dirty="0"/>
+              <a:t> on line 32</a:t>
+            </a:r>
+            <a:endParaRPr lang="fr-FR" sz="4000" b="1" dirty="0" smtClean="0">
+              <a:solidFill>
+                <a:srgbClr val="C00000"/>
+              </a:solidFill>
+            </a:endParaRPr>
+          </a:p>
+        </p:txBody>
+      </p:sp>
+      <p:sp>
+        <p:nvSpPr>
+          <p:cNvPr id="6" name="Rectangle 5"/>
+          <p:cNvSpPr/>
+          <p:nvPr/>
+        </p:nvSpPr>
+        <p:spPr>
+          <a:xfrm>
+            <a:off x="609258" y="2784353"/>
+            <a:ext cx="10985500" cy="3293209"/>
+          </a:xfrm>
+          <a:prstGeom prst="rect">
+            <a:avLst/>
+          </a:prstGeom>
+        </p:spPr>
+        <p:txBody>
+          <a:bodyPr wrap="square">
+            <a:spAutoFit/>
+          </a:bodyPr>
+          <a:lstStyle/>
+          <a:p>
+            <a:pPr marL="800100" lvl="1" indent="-342900">
+              <a:buFont typeface="Arial" panose="020B0604020202020204" pitchFamily="34" charset="0"/>
+              <a:buChar char="•"/>
+            </a:pPr>
+            <a:r>
+              <a:rPr lang="en-US" sz="3200" dirty="0" err="1" smtClean="0"/>
+              <a:t>Création</a:t>
+            </a:r>
+            <a:r>
+              <a:rPr lang="en-US" sz="3200" dirty="0" smtClean="0"/>
+              <a:t> function de </a:t>
+            </a:r>
+            <a:r>
+              <a:rPr lang="en-US" sz="3200" dirty="0" err="1" smtClean="0"/>
+              <a:t>débuggage</a:t>
+            </a:r>
+            <a:endParaRPr lang="en-US" sz="3200" dirty="0" smtClean="0"/>
+          </a:p>
+          <a:p>
+            <a:pPr marL="800100" lvl="1" indent="-342900">
+              <a:buFont typeface="Arial" panose="020B0604020202020204" pitchFamily="34" charset="0"/>
+              <a:buChar char="•"/>
+            </a:pPr>
+            <a:endParaRPr lang="en-US" sz="3200" b="1" dirty="0">
+              <a:solidFill>
+                <a:srgbClr val="C00000"/>
+              </a:solidFill>
+            </a:endParaRPr>
+          </a:p>
+          <a:p>
+            <a:pPr lvl="1"/>
+            <a:r>
+              <a:rPr lang="fr-FR" sz="2400" b="1" dirty="0" err="1">
+                <a:solidFill>
+                  <a:srgbClr val="C00000"/>
+                </a:solidFill>
+              </a:rPr>
+              <a:t>function</a:t>
+            </a:r>
+            <a:r>
+              <a:rPr lang="fr-FR" sz="2400" b="1" dirty="0">
+                <a:solidFill>
+                  <a:srgbClr val="C00000"/>
+                </a:solidFill>
+              </a:rPr>
+              <a:t> </a:t>
+            </a:r>
+            <a:r>
+              <a:rPr lang="fr-FR" sz="2400" b="1" dirty="0" err="1">
+                <a:solidFill>
+                  <a:srgbClr val="C00000"/>
+                </a:solidFill>
+              </a:rPr>
+              <a:t>mydebug</a:t>
+            </a:r>
+            <a:r>
+              <a:rPr lang="fr-FR" sz="2400" b="1" dirty="0">
+                <a:solidFill>
+                  <a:srgbClr val="C00000"/>
+                </a:solidFill>
+              </a:rPr>
+              <a:t>($variable) {</a:t>
+            </a:r>
+          </a:p>
+          <a:p>
+            <a:pPr lvl="1"/>
+            <a:r>
+              <a:rPr lang="fr-FR" sz="2400" b="1" dirty="0">
+                <a:solidFill>
+                  <a:srgbClr val="C00000"/>
+                </a:solidFill>
+              </a:rPr>
+              <a:t>  </a:t>
+            </a:r>
+            <a:r>
+              <a:rPr lang="fr-FR" sz="2400" b="1" dirty="0" err="1">
+                <a:solidFill>
+                  <a:srgbClr val="C00000"/>
+                </a:solidFill>
+              </a:rPr>
+              <a:t>echo</a:t>
+            </a:r>
+            <a:r>
+              <a:rPr lang="fr-FR" sz="2400" b="1" dirty="0">
+                <a:solidFill>
+                  <a:srgbClr val="C00000"/>
+                </a:solidFill>
+              </a:rPr>
+              <a:t> '&lt;</a:t>
+            </a:r>
+            <a:r>
+              <a:rPr lang="fr-FR" sz="2400" b="1" dirty="0" err="1">
+                <a:solidFill>
+                  <a:srgbClr val="C00000"/>
+                </a:solidFill>
+              </a:rPr>
+              <a:t>pre</a:t>
+            </a:r>
+            <a:r>
+              <a:rPr lang="fr-FR" sz="2400" b="1" dirty="0">
+                <a:solidFill>
+                  <a:srgbClr val="C00000"/>
+                </a:solidFill>
+              </a:rPr>
+              <a:t>&gt;';</a:t>
+            </a:r>
+          </a:p>
+          <a:p>
+            <a:pPr lvl="1"/>
+            <a:r>
+              <a:rPr lang="fr-FR" sz="2400" b="1" dirty="0">
+                <a:solidFill>
+                  <a:srgbClr val="C00000"/>
+                </a:solidFill>
+              </a:rPr>
+              <a:t>  </a:t>
+            </a:r>
+            <a:r>
+              <a:rPr lang="fr-FR" sz="2400" b="1" dirty="0" err="1">
+                <a:solidFill>
+                  <a:srgbClr val="C00000"/>
+                </a:solidFill>
+              </a:rPr>
+              <a:t>var_dump</a:t>
+            </a:r>
+            <a:r>
+              <a:rPr lang="fr-FR" sz="2400" b="1" dirty="0">
+                <a:solidFill>
+                  <a:srgbClr val="C00000"/>
+                </a:solidFill>
+              </a:rPr>
+              <a:t>($variable);</a:t>
+            </a:r>
+          </a:p>
+          <a:p>
+            <a:pPr lvl="1"/>
+            <a:r>
+              <a:rPr lang="fr-FR" sz="2400" b="1" dirty="0">
+                <a:solidFill>
+                  <a:srgbClr val="C00000"/>
+                </a:solidFill>
+              </a:rPr>
+              <a:t>  </a:t>
+            </a:r>
+            <a:r>
+              <a:rPr lang="fr-FR" sz="2400" b="1" dirty="0" err="1">
+                <a:solidFill>
+                  <a:srgbClr val="C00000"/>
+                </a:solidFill>
+              </a:rPr>
+              <a:t>echo</a:t>
+            </a:r>
+            <a:r>
+              <a:rPr lang="fr-FR" sz="2400" b="1" dirty="0">
+                <a:solidFill>
+                  <a:srgbClr val="C00000"/>
+                </a:solidFill>
+              </a:rPr>
+              <a:t> '&lt;/</a:t>
+            </a:r>
+            <a:r>
+              <a:rPr lang="fr-FR" sz="2400" b="1" dirty="0" err="1">
+                <a:solidFill>
+                  <a:srgbClr val="C00000"/>
+                </a:solidFill>
+              </a:rPr>
+              <a:t>pre</a:t>
+            </a:r>
+            <a:r>
+              <a:rPr lang="fr-FR" sz="2400" b="1" dirty="0">
+                <a:solidFill>
+                  <a:srgbClr val="C00000"/>
+                </a:solidFill>
+              </a:rPr>
+              <a:t>&gt;';</a:t>
+            </a:r>
+          </a:p>
+          <a:p>
+            <a:pPr lvl="1"/>
+            <a:r>
+              <a:rPr lang="fr-FR" sz="2400" b="1" dirty="0">
+                <a:solidFill>
+                  <a:srgbClr val="C00000"/>
+                </a:solidFill>
+              </a:rPr>
+              <a:t>  die();</a:t>
+            </a:r>
+          </a:p>
+          <a:p>
+            <a:pPr lvl="1"/>
+            <a:r>
+              <a:rPr lang="fr-FR" sz="2400" b="1" dirty="0">
+                <a:solidFill>
+                  <a:srgbClr val="C00000"/>
+                </a:solidFill>
+              </a:rPr>
+              <a:t>}</a:t>
+            </a:r>
+            <a:endParaRPr lang="fr-FR" sz="2400" b="1" dirty="0" smtClean="0">
+              <a:solidFill>
+                <a:srgbClr val="C00000"/>
+              </a:solidFill>
+            </a:endParaRPr>
+          </a:p>
+        </p:txBody>
+      </p:sp>
+    </p:spTree>
+    <p:extLst>
+      <p:ext uri="{BB962C8B-B14F-4D97-AF65-F5344CB8AC3E}">
+        <p14:creationId xmlns:p14="http://schemas.microsoft.com/office/powerpoint/2010/main" val="1926075758"/>
+      </p:ext>
+    </p:extLst>
+  </p:cSld>
+  <p:clrMapOvr>
+    <a:masterClrMapping/>
+  </p:clrMapOvr>
+  <p:transition/>
+  <p:timing>
+    <p:tnLst>
+      <p:par>
+        <p:cTn id="1" dur="indefinite" restart="never" nodeType="tmRoot"/>
+      </p:par>
+    </p:tnLst>
+  </p:timing>
+</p:sld>
+</file>
+
+<file path=ppt/slides/slide33.xml><?xml version="1.0" encoding="utf-8"?>
+<p:sld xmlns:a="http://schemas.openxmlformats.org/drawingml/2006/main" xmlns:r="http://schemas.openxmlformats.org/officeDocument/2006/relationships" xmlns:p="http://schemas.openxmlformats.org/presentationml/2006/main">
+  <p:cSld>
+    <p:spTree>
+      <p:nvGrpSpPr>
+        <p:cNvPr id="1" name=""/>
+        <p:cNvGrpSpPr/>
+        <p:nvPr/>
+      </p:nvGrpSpPr>
+      <p:grpSpPr>
+        <a:xfrm>
+          <a:off x="0" y="0"/>
+          <a:ext cx="0" cy="0"/>
+          <a:chOff x="0" y="0"/>
+          <a:chExt cx="0" cy="0"/>
+        </a:xfrm>
+      </p:grpSpPr>
+      <p:sp>
+        <p:nvSpPr>
+          <p:cNvPr id="28676" name="Title 1"/>
+          <p:cNvSpPr>
+            <a:spLocks noGrp="1"/>
+          </p:cNvSpPr>
+          <p:nvPr>
+            <p:ph type="title"/>
+          </p:nvPr>
+        </p:nvSpPr>
+        <p:spPr>
+          <a:xfrm>
+            <a:off x="596901" y="185739"/>
+            <a:ext cx="10985500" cy="920750"/>
+          </a:xfrm>
+        </p:spPr>
+        <p:txBody>
+          <a:bodyPr>
+            <a:normAutofit/>
+          </a:bodyPr>
+          <a:lstStyle/>
+          <a:p>
+            <a:r>
+              <a:rPr lang="fr-FR" sz="3600" b="1" dirty="0" err="1" smtClean="0"/>
+              <a:t>Debuguer</a:t>
+            </a:r>
+            <a:r>
+              <a:rPr lang="fr-FR" sz="3600" b="1" dirty="0" smtClean="0"/>
+              <a:t> son code </a:t>
+            </a:r>
+            <a:br>
+              <a:rPr lang="fr-FR" sz="3600" b="1" dirty="0" smtClean="0"/>
+            </a:br>
+            <a:r>
+              <a:rPr lang="fr-FR" sz="2700" b="1" dirty="0" smtClean="0">
+                <a:solidFill>
+                  <a:srgbClr val="C00000"/>
+                </a:solidFill>
+              </a:rPr>
+              <a:t>Erreurs fréquentes</a:t>
+            </a:r>
+            <a:endParaRPr lang="fr-FR" sz="2700" b="1" dirty="0">
+              <a:solidFill>
+                <a:srgbClr val="C00000"/>
+              </a:solidFill>
+            </a:endParaRPr>
+          </a:p>
+        </p:txBody>
+      </p:sp>
+      <p:sp>
+        <p:nvSpPr>
+          <p:cNvPr id="5" name="Espace réservé de la date 4"/>
+          <p:cNvSpPr txBox="1">
+            <a:spLocks/>
+          </p:cNvSpPr>
+          <p:nvPr/>
+        </p:nvSpPr>
+        <p:spPr>
+          <a:xfrm>
+            <a:off x="11125200" y="0"/>
+            <a:ext cx="1886000" cy="432486"/>
+          </a:xfrm>
+          <a:prstGeom prst="rect">
+            <a:avLst/>
+          </a:prstGeom>
+        </p:spPr>
+        <p:txBody>
+          <a:bodyPr/>
+          <a:lstStyle>
+            <a:defPPr>
+              <a:defRPr lang="en-US"/>
+            </a:defPPr>
+            <a:lvl1pPr marL="0" algn="l" defTabSz="914400" rtl="0" eaLnBrk="1" latinLnBrk="0" hangingPunct="1">
+              <a:defRPr sz="1800" kern="1200">
+                <a:solidFill>
+                  <a:schemeClr val="tx1"/>
+                </a:solidFill>
+                <a:latin typeface="+mn-lt"/>
+                <a:ea typeface="+mn-ea"/>
+                <a:cs typeface="+mn-cs"/>
+              </a:defRPr>
+            </a:lvl1pPr>
+            <a:lvl2pPr marL="457200" algn="l" defTabSz="914400" rtl="0" eaLnBrk="1" latinLnBrk="0" hangingPunct="1">
+              <a:defRPr sz="1800" kern="1200">
+                <a:solidFill>
+                  <a:schemeClr val="tx1"/>
+                </a:solidFill>
+                <a:latin typeface="+mn-lt"/>
+                <a:ea typeface="+mn-ea"/>
+                <a:cs typeface="+mn-cs"/>
+              </a:defRPr>
+            </a:lvl2pPr>
+            <a:lvl3pPr marL="914400" algn="l" defTabSz="914400" rtl="0" eaLnBrk="1" latinLnBrk="0" hangingPunct="1">
+              <a:defRPr sz="1800" kern="1200">
+                <a:solidFill>
+                  <a:schemeClr val="tx1"/>
+                </a:solidFill>
+                <a:latin typeface="+mn-lt"/>
+                <a:ea typeface="+mn-ea"/>
+                <a:cs typeface="+mn-cs"/>
+              </a:defRPr>
+            </a:lvl3pPr>
+            <a:lvl4pPr marL="1371600" algn="l" defTabSz="914400" rtl="0" eaLnBrk="1" latinLnBrk="0" hangingPunct="1">
+              <a:defRPr sz="1800" kern="1200">
+                <a:solidFill>
+                  <a:schemeClr val="tx1"/>
+                </a:solidFill>
+                <a:latin typeface="+mn-lt"/>
+                <a:ea typeface="+mn-ea"/>
+                <a:cs typeface="+mn-cs"/>
+              </a:defRPr>
+            </a:lvl4pPr>
+            <a:lvl5pPr marL="1828800" algn="l" defTabSz="914400" rtl="0" eaLnBrk="1" latinLnBrk="0" hangingPunct="1">
+              <a:defRPr sz="1800" kern="1200">
+                <a:solidFill>
+                  <a:schemeClr val="tx1"/>
+                </a:solidFill>
+                <a:latin typeface="+mn-lt"/>
+                <a:ea typeface="+mn-ea"/>
+                <a:cs typeface="+mn-cs"/>
+              </a:defRPr>
+            </a:lvl5pPr>
+            <a:lvl6pPr marL="2286000" algn="l" defTabSz="914400" rtl="0" eaLnBrk="1" latinLnBrk="0" hangingPunct="1">
+              <a:defRPr sz="1800" kern="1200">
+                <a:solidFill>
+                  <a:schemeClr val="tx1"/>
+                </a:solidFill>
+                <a:latin typeface="+mn-lt"/>
+                <a:ea typeface="+mn-ea"/>
+                <a:cs typeface="+mn-cs"/>
+              </a:defRPr>
+            </a:lvl6pPr>
+            <a:lvl7pPr marL="2743200" algn="l" defTabSz="914400" rtl="0" eaLnBrk="1" latinLnBrk="0" hangingPunct="1">
+              <a:defRPr sz="1800" kern="1200">
+                <a:solidFill>
+                  <a:schemeClr val="tx1"/>
+                </a:solidFill>
+                <a:latin typeface="+mn-lt"/>
+                <a:ea typeface="+mn-ea"/>
+                <a:cs typeface="+mn-cs"/>
+              </a:defRPr>
+            </a:lvl7pPr>
+            <a:lvl8pPr marL="3200400" algn="l" defTabSz="914400" rtl="0" eaLnBrk="1" latinLnBrk="0" hangingPunct="1">
+              <a:defRPr sz="1800" kern="1200">
+                <a:solidFill>
+                  <a:schemeClr val="tx1"/>
+                </a:solidFill>
+                <a:latin typeface="+mn-lt"/>
+                <a:ea typeface="+mn-ea"/>
+                <a:cs typeface="+mn-cs"/>
+              </a:defRPr>
+            </a:lvl8pPr>
+            <a:lvl9pPr marL="3657600" algn="l" defTabSz="914400" rtl="0" eaLnBrk="1" latinLnBrk="0" hangingPunct="1">
+              <a:defRPr sz="1800" kern="1200">
+                <a:solidFill>
+                  <a:schemeClr val="tx1"/>
+                </a:solidFill>
+                <a:latin typeface="+mn-lt"/>
+                <a:ea typeface="+mn-ea"/>
+                <a:cs typeface="+mn-cs"/>
+              </a:defRPr>
+            </a:lvl9pPr>
+          </a:lstStyle>
+          <a:p>
+            <a:pPr>
+              <a:defRPr/>
+            </a:pPr>
+            <a:fld id="{1FEAB85C-CFD1-4C7E-8896-8A3560B94D07}" type="datetime11">
+              <a:rPr lang="fr-FR" smtClean="0"/>
+              <a:pPr>
+                <a:defRPr/>
+              </a:pPr>
+              <a:t>08:32:32</a:t>
             </a:fld>
             <a:endParaRPr lang="fr-FR" dirty="0"/>
           </a:p>
@@ -17878,7 +18772,7 @@
 </p:sld>
 </file>
 
-<file path=ppt/slides/slide33.xml><?xml version="1.0" encoding="utf-8"?>
+<file path=ppt/slides/slide34.xml><?xml version="1.0" encoding="utf-8"?>
 <p:sld xmlns:a="http://schemas.openxmlformats.org/drawingml/2006/main" xmlns:r="http://schemas.openxmlformats.org/officeDocument/2006/relationships" xmlns:p="http://schemas.openxmlformats.org/presentationml/2006/main">
   <p:cSld>
     <p:spTree>
@@ -18216,7 +19110,196 @@
 </p:sld>
 </file>
 
-<file path=ppt/slides/slide34.xml><?xml version="1.0" encoding="utf-8"?>
+<file path=ppt/slides/slide35.xml><?xml version="1.0" encoding="utf-8"?>
+<p:sld xmlns:a="http://schemas.openxmlformats.org/drawingml/2006/main" xmlns:r="http://schemas.openxmlformats.org/officeDocument/2006/relationships" xmlns:p="http://schemas.openxmlformats.org/presentationml/2006/main">
+  <p:cSld>
+    <p:spTree>
+      <p:nvGrpSpPr>
+        <p:cNvPr id="1" name=""/>
+        <p:cNvGrpSpPr/>
+        <p:nvPr/>
+      </p:nvGrpSpPr>
+      <p:grpSpPr>
+        <a:xfrm>
+          <a:off x="0" y="0"/>
+          <a:ext cx="0" cy="0"/>
+          <a:chOff x="0" y="0"/>
+          <a:chExt cx="0" cy="0"/>
+        </a:xfrm>
+      </p:grpSpPr>
+      <p:sp>
+        <p:nvSpPr>
+          <p:cNvPr id="28676" name="Title 1"/>
+          <p:cNvSpPr>
+            <a:spLocks noGrp="1"/>
+          </p:cNvSpPr>
+          <p:nvPr>
+            <p:ph type="title"/>
+          </p:nvPr>
+        </p:nvSpPr>
+        <p:spPr/>
+        <p:txBody>
+          <a:bodyPr>
+            <a:normAutofit/>
+          </a:bodyPr>
+          <a:lstStyle/>
+          <a:p>
+            <a:r>
+              <a:rPr lang="fr-FR" sz="3600" b="1" dirty="0" smtClean="0"/>
+              <a:t>PHPSTORM &amp; XDEBUG</a:t>
+            </a:r>
+            <a:br>
+              <a:rPr lang="fr-FR" sz="3600" b="1" dirty="0" smtClean="0"/>
+            </a:br>
+            <a:r>
+              <a:rPr lang="fr-FR" sz="2700" b="1" dirty="0" smtClean="0">
+                <a:solidFill>
+                  <a:srgbClr val="C00000"/>
+                </a:solidFill>
+              </a:rPr>
+              <a:t>Configuration Docker &amp; PHP</a:t>
+            </a:r>
+            <a:endParaRPr lang="fr-FR" sz="2700" b="1" dirty="0">
+              <a:solidFill>
+                <a:srgbClr val="C00000"/>
+              </a:solidFill>
+            </a:endParaRPr>
+          </a:p>
+        </p:txBody>
+      </p:sp>
+      <p:sp>
+        <p:nvSpPr>
+          <p:cNvPr id="2" name="Rectangle 1"/>
+          <p:cNvSpPr/>
+          <p:nvPr/>
+        </p:nvSpPr>
+        <p:spPr>
+          <a:xfrm>
+            <a:off x="596901" y="1341209"/>
+            <a:ext cx="12135678" cy="2308324"/>
+          </a:xfrm>
+          <a:prstGeom prst="rect">
+            <a:avLst/>
+          </a:prstGeom>
+        </p:spPr>
+        <p:txBody>
+          <a:bodyPr wrap="square">
+            <a:spAutoFit/>
+          </a:bodyPr>
+          <a:lstStyle/>
+          <a:p>
+            <a:r>
+              <a:rPr lang="fr-FR" dirty="0" smtClean="0"/>
+              <a:t>[</a:t>
+            </a:r>
+            <a:r>
+              <a:rPr lang="fr-FR" dirty="0" err="1" smtClean="0"/>
+              <a:t>xdebug</a:t>
+            </a:r>
+            <a:r>
+              <a:rPr lang="fr-FR" dirty="0"/>
+              <a:t>]</a:t>
+            </a:r>
+          </a:p>
+          <a:p>
+            <a:r>
+              <a:rPr lang="fr-FR" dirty="0" err="1"/>
+              <a:t>zend_extension</a:t>
+            </a:r>
+            <a:r>
+              <a:rPr lang="fr-FR" dirty="0"/>
+              <a:t>="c:/wamp64/bin/php/php7.2.18/zend_ext/php_xdebug-2.7.2-7.2-vc15-x86_64.dll"</a:t>
+            </a:r>
+          </a:p>
+          <a:p>
+            <a:r>
+              <a:rPr lang="fr-FR" dirty="0" err="1"/>
+              <a:t>xdebug.remote_enable</a:t>
+            </a:r>
+            <a:r>
+              <a:rPr lang="fr-FR" dirty="0"/>
+              <a:t> = On</a:t>
+            </a:r>
+          </a:p>
+          <a:p>
+            <a:r>
+              <a:rPr lang="fr-FR" dirty="0" err="1"/>
+              <a:t>xdebug.profiler_enable</a:t>
+            </a:r>
+            <a:r>
+              <a:rPr lang="fr-FR" dirty="0"/>
+              <a:t> = off</a:t>
+            </a:r>
+          </a:p>
+          <a:p>
+            <a:r>
+              <a:rPr lang="fr-FR" dirty="0" err="1"/>
+              <a:t>xdebug.profiler_enable_trigger</a:t>
+            </a:r>
+            <a:r>
+              <a:rPr lang="fr-FR" dirty="0"/>
+              <a:t> = Off</a:t>
+            </a:r>
+          </a:p>
+          <a:p>
+            <a:r>
+              <a:rPr lang="fr-FR" dirty="0" err="1"/>
+              <a:t>xdebug.profiler_output_name</a:t>
+            </a:r>
+            <a:r>
+              <a:rPr lang="fr-FR" dirty="0"/>
+              <a:t> = </a:t>
+            </a:r>
+            <a:r>
+              <a:rPr lang="fr-FR" dirty="0" err="1"/>
+              <a:t>cachegrind.out.%t.%p</a:t>
+            </a:r>
+            <a:endParaRPr lang="fr-FR" dirty="0"/>
+          </a:p>
+          <a:p>
+            <a:r>
+              <a:rPr lang="fr-FR" dirty="0" err="1"/>
+              <a:t>xdebug.profiler_output_dir</a:t>
+            </a:r>
+            <a:r>
+              <a:rPr lang="fr-FR" dirty="0"/>
+              <a:t> ="c:/wamp64/tmp"</a:t>
+            </a:r>
+          </a:p>
+          <a:p>
+            <a:r>
+              <a:rPr lang="fr-FR" dirty="0" err="1"/>
+              <a:t>xdebug.show_local_vars</a:t>
+            </a:r>
+            <a:r>
+              <a:rPr lang="fr-FR" dirty="0"/>
+              <a:t>=0</a:t>
+            </a:r>
+          </a:p>
+        </p:txBody>
+      </p:sp>
+    </p:spTree>
+    <p:extLst>
+      <p:ext uri="{BB962C8B-B14F-4D97-AF65-F5344CB8AC3E}">
+        <p14:creationId xmlns:p14="http://schemas.microsoft.com/office/powerpoint/2010/main" val="2406918832"/>
+      </p:ext>
+    </p:extLst>
+  </p:cSld>
+  <p:clrMapOvr>
+    <a:masterClrMapping/>
+  </p:clrMapOvr>
+  <p:transition/>
+  <p:timing>
+    <p:tnLst>
+      <p:par>
+        <p:cTn id="1" dur="indefinite" restart="never" nodeType="tmRoot"/>
+      </p:par>
+    </p:tnLst>
+  </p:timing>
+</p:sld>
+</file>
+
+<file path=ppt/slides/slide36.xml><?xml version="1.0" encoding="utf-8"?>
 <p:sld xmlns:a="http://schemas.openxmlformats.org/drawingml/2006/main" xmlns:r="http://schemas.openxmlformats.org/officeDocument/2006/relationships" xmlns:p="http://schemas.openxmlformats.org/presentationml/2006/main">
   <p:cSld>
     <p:spTree>
@@ -18398,7 +19481,7 @@
 </p:sld>
 </file>
 
-<file path=ppt/slides/slide35.xml><?xml version="1.0" encoding="utf-8"?>
+<file path=ppt/slides/slide37.xml><?xml version="1.0" encoding="utf-8"?>
 <p:sld xmlns:a="http://schemas.openxmlformats.org/drawingml/2006/main" xmlns:r="http://schemas.openxmlformats.org/officeDocument/2006/relationships" xmlns:p="http://schemas.openxmlformats.org/presentationml/2006/main">
   <p:cSld>
     <p:spTree>
@@ -18554,7 +19637,7 @@
 </p:sld>
 </file>
 
-<file path=ppt/slides/slide36.xml><?xml version="1.0" encoding="utf-8"?>
+<file path=ppt/slides/slide38.xml><?xml version="1.0" encoding="utf-8"?>
 <p:sld xmlns:a="http://schemas.openxmlformats.org/drawingml/2006/main" xmlns:r="http://schemas.openxmlformats.org/officeDocument/2006/relationships" xmlns:p="http://schemas.openxmlformats.org/presentationml/2006/main">
   <p:cSld>
     <p:spTree>
@@ -18767,7 +19850,7 @@
         </p:blipFill>
         <p:spPr>
           <a:xfrm>
-            <a:off x="4068763" y="4601313"/>
+            <a:off x="4095116" y="4498975"/>
             <a:ext cx="1562100" cy="2028825"/>
           </a:xfrm>
           <a:prstGeom prst="rect">
@@ -18796,7 +19879,7 @@
 </p:sld>
 </file>
 
-<file path=ppt/slides/slide37.xml><?xml version="1.0" encoding="utf-8"?>
+<file path=ppt/slides/slide39.xml><?xml version="1.0" encoding="utf-8"?>
 <p:sld xmlns:a="http://schemas.openxmlformats.org/drawingml/2006/main" xmlns:r="http://schemas.openxmlformats.org/officeDocument/2006/relationships" xmlns:p="http://schemas.openxmlformats.org/presentationml/2006/main">
   <p:cSld>
     <p:spTree>
@@ -18994,7 +20077,271 @@
 </p:sld>
 </file>
 
-<file path=ppt/slides/slide38.xml><?xml version="1.0" encoding="utf-8"?>
+<file path=ppt/slides/slide4.xml><?xml version="1.0" encoding="utf-8"?>
+<p:sld xmlns:a="http://schemas.openxmlformats.org/drawingml/2006/main" xmlns:r="http://schemas.openxmlformats.org/officeDocument/2006/relationships" xmlns:p="http://schemas.openxmlformats.org/presentationml/2006/main">
+  <p:cSld>
+    <p:spTree>
+      <p:nvGrpSpPr>
+        <p:cNvPr id="1" name=""/>
+        <p:cNvGrpSpPr/>
+        <p:nvPr/>
+      </p:nvGrpSpPr>
+      <p:grpSpPr>
+        <a:xfrm>
+          <a:off x="0" y="0"/>
+          <a:ext cx="0" cy="0"/>
+          <a:chOff x="0" y="0"/>
+          <a:chExt cx="0" cy="0"/>
+        </a:xfrm>
+      </p:grpSpPr>
+      <p:sp>
+        <p:nvSpPr>
+          <p:cNvPr id="28676" name="Title 1"/>
+          <p:cNvSpPr>
+            <a:spLocks noGrp="1"/>
+          </p:cNvSpPr>
+          <p:nvPr>
+            <p:ph type="title"/>
+          </p:nvPr>
+        </p:nvSpPr>
+        <p:spPr/>
+        <p:txBody>
+          <a:bodyPr>
+            <a:normAutofit/>
+          </a:bodyPr>
+          <a:lstStyle/>
+          <a:p>
+            <a:r>
+              <a:rPr lang="fr-FR" sz="3600" b="1" dirty="0" smtClean="0"/>
+              <a:t>C’est quoi PHP ?</a:t>
+            </a:r>
+            <a:br>
+              <a:rPr lang="fr-FR" sz="3600" b="1" dirty="0" smtClean="0"/>
+            </a:br>
+            <a:r>
+              <a:rPr lang="fr-FR" sz="2700" b="1" dirty="0" smtClean="0">
+                <a:solidFill>
+                  <a:srgbClr val="C00000"/>
+                </a:solidFill>
+              </a:rPr>
+              <a:t>Quelles sont vos </a:t>
+            </a:r>
+            <a:r>
+              <a:rPr lang="fr-FR" sz="2700" b="1" dirty="0">
+                <a:solidFill>
+                  <a:srgbClr val="C00000"/>
+                </a:solidFill>
+              </a:rPr>
+              <a:t>connaissances ? </a:t>
+            </a:r>
+            <a:r>
+              <a:rPr lang="fr-FR" sz="2700" b="1" dirty="0" smtClean="0">
+                <a:solidFill>
+                  <a:srgbClr val="C00000"/>
+                </a:solidFill>
+              </a:rPr>
+              <a:t>http://www.php.net</a:t>
+            </a:r>
+            <a:endParaRPr lang="fr-FR" sz="2700" b="1" dirty="0">
+              <a:solidFill>
+                <a:srgbClr val="C00000"/>
+              </a:solidFill>
+            </a:endParaRPr>
+          </a:p>
+        </p:txBody>
+      </p:sp>
+      <p:sp>
+        <p:nvSpPr>
+          <p:cNvPr id="7" name="Espace réservé de la date 4"/>
+          <p:cNvSpPr txBox="1">
+            <a:spLocks/>
+          </p:cNvSpPr>
+          <p:nvPr/>
+        </p:nvSpPr>
+        <p:spPr>
+          <a:xfrm>
+            <a:off x="11125200" y="0"/>
+            <a:ext cx="1886000" cy="432486"/>
+          </a:xfrm>
+          <a:prstGeom prst="rect">
+            <a:avLst/>
+          </a:prstGeom>
+        </p:spPr>
+        <p:txBody>
+          <a:bodyPr/>
+          <a:lstStyle>
+            <a:defPPr>
+              <a:defRPr lang="en-US"/>
+            </a:defPPr>
+            <a:lvl1pPr marL="0" algn="l" defTabSz="914400" rtl="0" eaLnBrk="1" latinLnBrk="0" hangingPunct="1">
+              <a:defRPr sz="1800" kern="1200">
+                <a:solidFill>
+                  <a:schemeClr val="tx1"/>
+                </a:solidFill>
+                <a:latin typeface="+mn-lt"/>
+                <a:ea typeface="+mn-ea"/>
+                <a:cs typeface="+mn-cs"/>
+              </a:defRPr>
+            </a:lvl1pPr>
+            <a:lvl2pPr marL="457200" algn="l" defTabSz="914400" rtl="0" eaLnBrk="1" latinLnBrk="0" hangingPunct="1">
+              <a:defRPr sz="1800" kern="1200">
+                <a:solidFill>
+                  <a:schemeClr val="tx1"/>
+                </a:solidFill>
+                <a:latin typeface="+mn-lt"/>
+                <a:ea typeface="+mn-ea"/>
+                <a:cs typeface="+mn-cs"/>
+              </a:defRPr>
+            </a:lvl2pPr>
+            <a:lvl3pPr marL="914400" algn="l" defTabSz="914400" rtl="0" eaLnBrk="1" latinLnBrk="0" hangingPunct="1">
+              <a:defRPr sz="1800" kern="1200">
+                <a:solidFill>
+                  <a:schemeClr val="tx1"/>
+                </a:solidFill>
+                <a:latin typeface="+mn-lt"/>
+                <a:ea typeface="+mn-ea"/>
+                <a:cs typeface="+mn-cs"/>
+              </a:defRPr>
+            </a:lvl3pPr>
+            <a:lvl4pPr marL="1371600" algn="l" defTabSz="914400" rtl="0" eaLnBrk="1" latinLnBrk="0" hangingPunct="1">
+              <a:defRPr sz="1800" kern="1200">
+                <a:solidFill>
+                  <a:schemeClr val="tx1"/>
+                </a:solidFill>
+                <a:latin typeface="+mn-lt"/>
+                <a:ea typeface="+mn-ea"/>
+                <a:cs typeface="+mn-cs"/>
+              </a:defRPr>
+            </a:lvl4pPr>
+            <a:lvl5pPr marL="1828800" algn="l" defTabSz="914400" rtl="0" eaLnBrk="1" latinLnBrk="0" hangingPunct="1">
+              <a:defRPr sz="1800" kern="1200">
+                <a:solidFill>
+                  <a:schemeClr val="tx1"/>
+                </a:solidFill>
+                <a:latin typeface="+mn-lt"/>
+                <a:ea typeface="+mn-ea"/>
+                <a:cs typeface="+mn-cs"/>
+              </a:defRPr>
+            </a:lvl5pPr>
+            <a:lvl6pPr marL="2286000" algn="l" defTabSz="914400" rtl="0" eaLnBrk="1" latinLnBrk="0" hangingPunct="1">
+              <a:defRPr sz="1800" kern="1200">
+                <a:solidFill>
+                  <a:schemeClr val="tx1"/>
+                </a:solidFill>
+                <a:latin typeface="+mn-lt"/>
+                <a:ea typeface="+mn-ea"/>
+                <a:cs typeface="+mn-cs"/>
+              </a:defRPr>
+            </a:lvl6pPr>
+            <a:lvl7pPr marL="2743200" algn="l" defTabSz="914400" rtl="0" eaLnBrk="1" latinLnBrk="0" hangingPunct="1">
+              <a:defRPr sz="1800" kern="1200">
+                <a:solidFill>
+                  <a:schemeClr val="tx1"/>
+                </a:solidFill>
+                <a:latin typeface="+mn-lt"/>
+                <a:ea typeface="+mn-ea"/>
+                <a:cs typeface="+mn-cs"/>
+              </a:defRPr>
+            </a:lvl7pPr>
+            <a:lvl8pPr marL="3200400" algn="l" defTabSz="914400" rtl="0" eaLnBrk="1" latinLnBrk="0" hangingPunct="1">
+              <a:defRPr sz="1800" kern="1200">
+                <a:solidFill>
+                  <a:schemeClr val="tx1"/>
+                </a:solidFill>
+                <a:latin typeface="+mn-lt"/>
+                <a:ea typeface="+mn-ea"/>
+                <a:cs typeface="+mn-cs"/>
+              </a:defRPr>
+            </a:lvl8pPr>
+            <a:lvl9pPr marL="3657600" algn="l" defTabSz="914400" rtl="0" eaLnBrk="1" latinLnBrk="0" hangingPunct="1">
+              <a:defRPr sz="1800" kern="1200">
+                <a:solidFill>
+                  <a:schemeClr val="tx1"/>
+                </a:solidFill>
+                <a:latin typeface="+mn-lt"/>
+                <a:ea typeface="+mn-ea"/>
+                <a:cs typeface="+mn-cs"/>
+              </a:defRPr>
+            </a:lvl9pPr>
+          </a:lstStyle>
+          <a:p>
+            <a:pPr>
+              <a:defRPr/>
+            </a:pPr>
+            <a:fld id="{1FEAB85C-CFD1-4C7E-8896-8A3560B94D07}" type="datetime11">
+              <a:rPr lang="fr-FR" smtClean="0"/>
+              <a:pPr>
+                <a:defRPr/>
+              </a:pPr>
+              <a:t>08:32:32</a:t>
+            </a:fld>
+            <a:endParaRPr lang="fr-FR" dirty="0"/>
+          </a:p>
+        </p:txBody>
+      </p:sp>
+      <p:pic>
+        <p:nvPicPr>
+          <p:cNvPr id="2050" name="Picture 2" descr="Fichier:Modèle de Platon de la connaissance fr.gif"/>
+          <p:cNvPicPr>
+            <a:picLocks noChangeAspect="1" noChangeArrowheads="1"/>
+          </p:cNvPicPr>
+          <p:nvPr/>
+        </p:nvPicPr>
+        <p:blipFill>
+          <a:blip r:embed="rId3">
+            <a:extLst>
+              <a:ext uri="{28A0092B-C50C-407E-A947-70E740481C1C}">
+                <a14:useLocalDpi xmlns:a14="http://schemas.microsoft.com/office/drawing/2010/main" val="0"/>
+              </a:ext>
+            </a:extLst>
+          </a:blip>
+          <a:srcRect/>
+          <a:stretch>
+            <a:fillRect/>
+          </a:stretch>
+        </p:blipFill>
+        <p:spPr bwMode="auto">
+          <a:xfrm>
+            <a:off x="2508421" y="1477579"/>
+            <a:ext cx="7689851" cy="4511082"/>
+          </a:xfrm>
+          <a:prstGeom prst="rect">
+            <a:avLst/>
+          </a:prstGeom>
+          <a:noFill/>
+          <a:extLst>
+            <a:ext uri="{909E8E84-426E-40DD-AFC4-6F175D3DCCD1}">
+              <a14:hiddenFill xmlns:a14="http://schemas.microsoft.com/office/drawing/2010/main">
+                <a:solidFill>
+                  <a:srgbClr val="FFFFFF"/>
+                </a:solidFill>
+              </a14:hiddenFill>
+            </a:ext>
+          </a:extLst>
+        </p:spPr>
+      </p:pic>
+    </p:spTree>
+    <p:extLst>
+      <p:ext uri="{BB962C8B-B14F-4D97-AF65-F5344CB8AC3E}">
+        <p14:creationId xmlns:p14="http://schemas.microsoft.com/office/powerpoint/2010/main" val="3072102795"/>
+      </p:ext>
+    </p:extLst>
+  </p:cSld>
+  <p:clrMapOvr>
+    <a:masterClrMapping/>
+  </p:clrMapOvr>
+  <p:transition/>
+  <p:timing>
+    <p:tnLst>
+      <p:par>
+        <p:cTn id="1" dur="indefinite" restart="never" nodeType="tmRoot"/>
+      </p:par>
+    </p:tnLst>
+  </p:timing>
+</p:sld>
+</file>
+
+<file path=ppt/slides/slide40.xml><?xml version="1.0" encoding="utf-8"?>
 <p:sld xmlns:a="http://schemas.openxmlformats.org/drawingml/2006/main" xmlns:r="http://schemas.openxmlformats.org/officeDocument/2006/relationships" xmlns:p="http://schemas.openxmlformats.org/presentationml/2006/main">
   <p:cSld>
     <p:spTree>
@@ -19263,274 +20610,6 @@
 </p:sld>
 </file>
 
-<file path=ppt/slides/slide4.xml><?xml version="1.0" encoding="utf-8"?>
-<p:sld xmlns:a="http://schemas.openxmlformats.org/drawingml/2006/main" xmlns:r="http://schemas.openxmlformats.org/officeDocument/2006/relationships" xmlns:p="http://schemas.openxmlformats.org/presentationml/2006/main">
-  <p:cSld>
-    <p:spTree>
-      <p:nvGrpSpPr>
-        <p:cNvPr id="1" name=""/>
-        <p:cNvGrpSpPr/>
-        <p:nvPr/>
-      </p:nvGrpSpPr>
-      <p:grpSpPr>
-        <a:xfrm>
-          <a:off x="0" y="0"/>
-          <a:ext cx="0" cy="0"/>
-          <a:chOff x="0" y="0"/>
-          <a:chExt cx="0" cy="0"/>
-        </a:xfrm>
-      </p:grpSpPr>
-      <p:sp>
-        <p:nvSpPr>
-          <p:cNvPr id="28676" name="Title 1"/>
-          <p:cNvSpPr>
-            <a:spLocks noGrp="1"/>
-          </p:cNvSpPr>
-          <p:nvPr>
-            <p:ph type="title"/>
-          </p:nvPr>
-        </p:nvSpPr>
-        <p:spPr/>
-        <p:txBody>
-          <a:bodyPr>
-            <a:normAutofit/>
-          </a:bodyPr>
-          <a:lstStyle/>
-          <a:p>
-            <a:r>
-              <a:rPr lang="fr-FR" sz="3600" b="1" dirty="0" smtClean="0"/>
-              <a:t>C’est quoi PHP </a:t>
-            </a:r>
-            <a:r>
-              <a:rPr lang="fr-FR" sz="3600" b="1" dirty="0" smtClean="0"/>
-              <a:t>?</a:t>
-            </a:r>
-            <a:br>
-              <a:rPr lang="fr-FR" sz="3600" b="1" dirty="0" smtClean="0"/>
-            </a:br>
-            <a:r>
-              <a:rPr lang="fr-FR" sz="2700" b="1" dirty="0" smtClean="0">
-                <a:solidFill>
-                  <a:srgbClr val="C00000"/>
-                </a:solidFill>
-              </a:rPr>
-              <a:t>Quelles sont vos </a:t>
-            </a:r>
-            <a:r>
-              <a:rPr lang="fr-FR" sz="2700" b="1" dirty="0">
-                <a:solidFill>
-                  <a:srgbClr val="C00000"/>
-                </a:solidFill>
-              </a:rPr>
-              <a:t>connaissances ? </a:t>
-            </a:r>
-            <a:r>
-              <a:rPr lang="fr-FR" sz="2700" b="1" dirty="0" smtClean="0">
-                <a:solidFill>
-                  <a:srgbClr val="C00000"/>
-                </a:solidFill>
-              </a:rPr>
-              <a:t>http://www.php.net</a:t>
-            </a:r>
-            <a:endParaRPr lang="fr-FR" sz="2700" b="1" dirty="0">
-              <a:solidFill>
-                <a:srgbClr val="C00000"/>
-              </a:solidFill>
-            </a:endParaRPr>
-          </a:p>
-        </p:txBody>
-      </p:sp>
-      <p:sp>
-        <p:nvSpPr>
-          <p:cNvPr id="7" name="Espace réservé de la date 4"/>
-          <p:cNvSpPr txBox="1">
-            <a:spLocks/>
-          </p:cNvSpPr>
-          <p:nvPr/>
-        </p:nvSpPr>
-        <p:spPr>
-          <a:xfrm>
-            <a:off x="11125200" y="0"/>
-            <a:ext cx="1886000" cy="432486"/>
-          </a:xfrm>
-          <a:prstGeom prst="rect">
-            <a:avLst/>
-          </a:prstGeom>
-        </p:spPr>
-        <p:txBody>
-          <a:bodyPr/>
-          <a:lstStyle>
-            <a:defPPr>
-              <a:defRPr lang="en-US"/>
-            </a:defPPr>
-            <a:lvl1pPr marL="0" algn="l" defTabSz="914400" rtl="0" eaLnBrk="1" latinLnBrk="0" hangingPunct="1">
-              <a:defRPr sz="1800" kern="1200">
-                <a:solidFill>
-                  <a:schemeClr val="tx1"/>
-                </a:solidFill>
-                <a:latin typeface="+mn-lt"/>
-                <a:ea typeface="+mn-ea"/>
-                <a:cs typeface="+mn-cs"/>
-              </a:defRPr>
-            </a:lvl1pPr>
-            <a:lvl2pPr marL="457200" algn="l" defTabSz="914400" rtl="0" eaLnBrk="1" latinLnBrk="0" hangingPunct="1">
-              <a:defRPr sz="1800" kern="1200">
-                <a:solidFill>
-                  <a:schemeClr val="tx1"/>
-                </a:solidFill>
-                <a:latin typeface="+mn-lt"/>
-                <a:ea typeface="+mn-ea"/>
-                <a:cs typeface="+mn-cs"/>
-              </a:defRPr>
-            </a:lvl2pPr>
-            <a:lvl3pPr marL="914400" algn="l" defTabSz="914400" rtl="0" eaLnBrk="1" latinLnBrk="0" hangingPunct="1">
-              <a:defRPr sz="1800" kern="1200">
-                <a:solidFill>
-                  <a:schemeClr val="tx1"/>
-                </a:solidFill>
-                <a:latin typeface="+mn-lt"/>
-                <a:ea typeface="+mn-ea"/>
-                <a:cs typeface="+mn-cs"/>
-              </a:defRPr>
-            </a:lvl3pPr>
-            <a:lvl4pPr marL="1371600" algn="l" defTabSz="914400" rtl="0" eaLnBrk="1" latinLnBrk="0" hangingPunct="1">
-              <a:defRPr sz="1800" kern="1200">
-                <a:solidFill>
-                  <a:schemeClr val="tx1"/>
-                </a:solidFill>
-                <a:latin typeface="+mn-lt"/>
-                <a:ea typeface="+mn-ea"/>
-                <a:cs typeface="+mn-cs"/>
-              </a:defRPr>
-            </a:lvl4pPr>
-            <a:lvl5pPr marL="1828800" algn="l" defTabSz="914400" rtl="0" eaLnBrk="1" latinLnBrk="0" hangingPunct="1">
-              <a:defRPr sz="1800" kern="1200">
-                <a:solidFill>
-                  <a:schemeClr val="tx1"/>
-                </a:solidFill>
-                <a:latin typeface="+mn-lt"/>
-                <a:ea typeface="+mn-ea"/>
-                <a:cs typeface="+mn-cs"/>
-              </a:defRPr>
-            </a:lvl5pPr>
-            <a:lvl6pPr marL="2286000" algn="l" defTabSz="914400" rtl="0" eaLnBrk="1" latinLnBrk="0" hangingPunct="1">
-              <a:defRPr sz="1800" kern="1200">
-                <a:solidFill>
-                  <a:schemeClr val="tx1"/>
-                </a:solidFill>
-                <a:latin typeface="+mn-lt"/>
-                <a:ea typeface="+mn-ea"/>
-                <a:cs typeface="+mn-cs"/>
-              </a:defRPr>
-            </a:lvl6pPr>
-            <a:lvl7pPr marL="2743200" algn="l" defTabSz="914400" rtl="0" eaLnBrk="1" latinLnBrk="0" hangingPunct="1">
-              <a:defRPr sz="1800" kern="1200">
-                <a:solidFill>
-                  <a:schemeClr val="tx1"/>
-                </a:solidFill>
-                <a:latin typeface="+mn-lt"/>
-                <a:ea typeface="+mn-ea"/>
-                <a:cs typeface="+mn-cs"/>
-              </a:defRPr>
-            </a:lvl7pPr>
-            <a:lvl8pPr marL="3200400" algn="l" defTabSz="914400" rtl="0" eaLnBrk="1" latinLnBrk="0" hangingPunct="1">
-              <a:defRPr sz="1800" kern="1200">
-                <a:solidFill>
-                  <a:schemeClr val="tx1"/>
-                </a:solidFill>
-                <a:latin typeface="+mn-lt"/>
-                <a:ea typeface="+mn-ea"/>
-                <a:cs typeface="+mn-cs"/>
-              </a:defRPr>
-            </a:lvl8pPr>
-            <a:lvl9pPr marL="3657600" algn="l" defTabSz="914400" rtl="0" eaLnBrk="1" latinLnBrk="0" hangingPunct="1">
-              <a:defRPr sz="1800" kern="1200">
-                <a:solidFill>
-                  <a:schemeClr val="tx1"/>
-                </a:solidFill>
-                <a:latin typeface="+mn-lt"/>
-                <a:ea typeface="+mn-ea"/>
-                <a:cs typeface="+mn-cs"/>
-              </a:defRPr>
-            </a:lvl9pPr>
-          </a:lstStyle>
-          <a:p>
-            <a:pPr>
-              <a:defRPr/>
-            </a:pPr>
-            <a:fld id="{1FEAB85C-CFD1-4C7E-8896-8A3560B94D07}" type="datetime11">
-              <a:rPr lang="fr-FR" smtClean="0"/>
-              <a:pPr>
-                <a:defRPr/>
-              </a:pPr>
-              <a:t>23:53:17</a:t>
-            </a:fld>
-            <a:endParaRPr lang="fr-FR" dirty="0"/>
-          </a:p>
-        </p:txBody>
-      </p:sp>
-      <p:pic>
-        <p:nvPicPr>
-          <p:cNvPr id="2050" name="Picture 2" descr="Fichier:Modèle de Platon de la connaissance fr.gif"/>
-          <p:cNvPicPr>
-            <a:picLocks noChangeAspect="1" noChangeArrowheads="1"/>
-          </p:cNvPicPr>
-          <p:nvPr/>
-        </p:nvPicPr>
-        <p:blipFill>
-          <a:blip r:embed="rId3">
-            <a:extLst>
-              <a:ext uri="{28A0092B-C50C-407E-A947-70E740481C1C}">
-                <a14:useLocalDpi xmlns:a14="http://schemas.microsoft.com/office/drawing/2010/main" val="0"/>
-              </a:ext>
-            </a:extLst>
-          </a:blip>
-          <a:srcRect/>
-          <a:stretch>
-            <a:fillRect/>
-          </a:stretch>
-        </p:blipFill>
-        <p:spPr bwMode="auto">
-          <a:xfrm>
-            <a:off x="2508421" y="1477579"/>
-            <a:ext cx="7689851" cy="4511082"/>
-          </a:xfrm>
-          <a:prstGeom prst="rect">
-            <a:avLst/>
-          </a:prstGeom>
-          <a:noFill/>
-          <a:extLst>
-            <a:ext uri="{909E8E84-426E-40DD-AFC4-6F175D3DCCD1}">
-              <a14:hiddenFill xmlns:a14="http://schemas.microsoft.com/office/drawing/2010/main">
-                <a:solidFill>
-                  <a:srgbClr val="FFFFFF"/>
-                </a:solidFill>
-              </a14:hiddenFill>
-            </a:ext>
-          </a:extLst>
-        </p:spPr>
-      </p:pic>
-    </p:spTree>
-    <p:extLst>
-      <p:ext uri="{BB962C8B-B14F-4D97-AF65-F5344CB8AC3E}">
-        <p14:creationId xmlns:p14="http://schemas.microsoft.com/office/powerpoint/2010/main" val="3072102795"/>
-      </p:ext>
-    </p:extLst>
-  </p:cSld>
-  <p:clrMapOvr>
-    <a:masterClrMapping/>
-  </p:clrMapOvr>
-  <p:transition/>
-  <p:timing>
-    <p:tnLst>
-      <p:par>
-        <p:cTn id="1" dur="indefinite" restart="never" nodeType="tmRoot"/>
-      </p:par>
-    </p:tnLst>
-  </p:timing>
-</p:sld>
-</file>
-
 <file path=ppt/slides/slide5.xml><?xml version="1.0" encoding="utf-8"?>
 <p:sld xmlns:a="http://schemas.openxmlformats.org/drawingml/2006/main" xmlns:r="http://schemas.openxmlformats.org/officeDocument/2006/relationships" xmlns:p="http://schemas.openxmlformats.org/presentationml/2006/main">
   <p:cSld>
@@ -19567,11 +20646,7 @@
           <a:p>
             <a:r>
               <a:rPr lang="fr-FR" sz="3600" b="1" dirty="0" smtClean="0"/>
-              <a:t>C’est quoi PHP </a:t>
-            </a:r>
-            <a:r>
-              <a:rPr lang="fr-FR" sz="3600" b="1" dirty="0" smtClean="0"/>
-              <a:t>?</a:t>
+              <a:t>C’est quoi PHP ?</a:t>
             </a:r>
             <a:br>
               <a:rPr lang="fr-FR" sz="3600" b="1" dirty="0" smtClean="0"/>
@@ -19715,7 +20790,7 @@
               <a:pPr>
                 <a:defRPr/>
               </a:pPr>
-              <a:t>00:16:28</a:t>
+              <a:t>08:32:32</a:t>
             </a:fld>
             <a:endParaRPr lang="fr-FR" dirty="0"/>
           </a:p>
@@ -19906,11 +20981,7 @@
           <a:p>
             <a:r>
               <a:rPr lang="fr-FR" sz="3600" b="1" dirty="0" smtClean="0"/>
-              <a:t>C’est quoi PHP </a:t>
-            </a:r>
-            <a:r>
-              <a:rPr lang="fr-FR" sz="3600" b="1" dirty="0" smtClean="0"/>
-              <a:t>?</a:t>
+              <a:t>C’est quoi PHP ?</a:t>
             </a:r>
             <a:br>
               <a:rPr lang="fr-FR" sz="3600" b="1" dirty="0" smtClean="0"/>
@@ -20054,7 +21125,7 @@
               <a:pPr>
                 <a:defRPr/>
               </a:pPr>
-              <a:t>00:25:47</a:t>
+              <a:t>08:32:32</a:t>
             </a:fld>
             <a:endParaRPr lang="fr-FR" dirty="0"/>
           </a:p>
@@ -20158,11 +21229,7 @@
           <a:p>
             <a:r>
               <a:rPr lang="fr-FR" sz="3600" b="1" dirty="0" smtClean="0"/>
-              <a:t>C’est quoi PHP </a:t>
-            </a:r>
-            <a:r>
-              <a:rPr lang="fr-FR" sz="3600" b="1" dirty="0" smtClean="0"/>
-              <a:t>?</a:t>
+              <a:t>C’est quoi PHP ?</a:t>
             </a:r>
             <a:br>
               <a:rPr lang="fr-FR" sz="3600" b="1" dirty="0" smtClean="0"/>
@@ -20355,7 +21422,6 @@
               <a:rPr lang="fr-FR" sz="2400" dirty="0" smtClean="0"/>
               <a:t>!</a:t>
             </a:r>
-            <a:endParaRPr lang="fr-FR" sz="2400" dirty="0" smtClean="0"/>
           </a:p>
         </p:txBody>
       </p:sp>
@@ -20482,7 +21548,7 @@
               <a:pPr>
                 <a:defRPr/>
               </a:pPr>
-              <a:t>23:07:05</a:t>
+              <a:t>08:32:32</a:t>
             </a:fld>
             <a:endParaRPr lang="fr-FR" dirty="0"/>
           </a:p>
@@ -20545,11 +21611,7 @@
           <a:p>
             <a:r>
               <a:rPr lang="fr-FR" sz="3600" b="1" dirty="0" smtClean="0"/>
-              <a:t>C’est quoi PHP </a:t>
-            </a:r>
-            <a:r>
-              <a:rPr lang="fr-FR" sz="3600" b="1" dirty="0" smtClean="0"/>
-              <a:t>?</a:t>
+              <a:t>C’est quoi PHP ?</a:t>
             </a:r>
             <a:br>
               <a:rPr lang="fr-FR" sz="3600" b="1" dirty="0" smtClean="0"/>
@@ -20693,7 +21755,7 @@
               <a:pPr>
                 <a:defRPr/>
               </a:pPr>
-              <a:t>23:14:53</a:t>
+              <a:t>08:32:32</a:t>
             </a:fld>
             <a:endParaRPr lang="fr-FR" dirty="0"/>
           </a:p>
@@ -20861,11 +21923,7 @@
           <a:p>
             <a:r>
               <a:rPr lang="fr-FR" sz="3600" b="1" dirty="0" smtClean="0"/>
-              <a:t>C’est quoi PHP </a:t>
-            </a:r>
-            <a:r>
-              <a:rPr lang="fr-FR" sz="3600" b="1" dirty="0" smtClean="0"/>
-              <a:t>?</a:t>
+              <a:t>C’est quoi PHP ?</a:t>
             </a:r>
             <a:br>
               <a:rPr lang="fr-FR" sz="3600" b="1" dirty="0" smtClean="0"/>
@@ -21009,7 +22067,7 @@
               <a:pPr>
                 <a:defRPr/>
               </a:pPr>
-              <a:t>23:17:02</a:t>
+              <a:t>08:32:32</a:t>
             </a:fld>
             <a:endParaRPr lang="fr-FR" dirty="0"/>
           </a:p>
@@ -21987,15 +23045,6 @@
 </file>
 
 <file path=customXml/item1.xml><?xml version="1.0" encoding="utf-8"?>
-<?mso-contentType ?>
-<FormTemplates xmlns="http://schemas.microsoft.com/sharepoint/v3/contenttype/forms">
-  <Display>DocumentLibraryForm</Display>
-  <Edit>DocumentLibraryForm</Edit>
-  <New>DocumentLibraryForm</New>
-</FormTemplates>
-</file>
-
-<file path=customXml/item2.xml><?xml version="1.0" encoding="utf-8"?>
 <p:properties xmlns:p="http://schemas.microsoft.com/office/2006/metadata/properties" xmlns:xsi="http://www.w3.org/2001/XMLSchema-instance" xmlns:pc="http://schemas.microsoft.com/office/infopath/2007/PartnerControls">
   <documentManagement>
     <_dlc_DocId xmlns="23337013-54cb-4768-9b3c-c163b11c772f">C7SS7DWPEH5J-47665541-121</_dlc_DocId>
@@ -22007,7 +23056,66 @@
 </p:properties>
 </file>
 
+<file path=customXml/item2.xml><?xml version="1.0" encoding="utf-8"?>
+<?mso-contentType ?>
+<FormTemplates xmlns="http://schemas.microsoft.com/sharepoint/v3/contenttype/forms">
+  <Display>DocumentLibraryForm</Display>
+  <Edit>DocumentLibraryForm</Edit>
+  <New>DocumentLibraryForm</New>
+</FormTemplates>
+</file>
+
 <file path=customXml/item3.xml><?xml version="1.0" encoding="utf-8"?>
+<?mso-contentType ?>
+<spe:Receivers xmlns:spe="http://schemas.microsoft.com/sharepoint/events">
+  <Receiver>
+    <Name>Document ID Generator</Name>
+    <Synchronization>Synchronous</Synchronization>
+    <Type>10001</Type>
+    <SequenceNumber>1000</SequenceNumber>
+    <Url/>
+    <Assembly>Microsoft.Office.DocumentManagement, Version=16.0.0.0, Culture=neutral, PublicKeyToken=71e9bce111e9429c</Assembly>
+    <Class>Microsoft.Office.DocumentManagement.Internal.DocIdHandler</Class>
+    <Data/>
+    <Filter/>
+  </Receiver>
+  <Receiver>
+    <Name>Document ID Generator</Name>
+    <Synchronization>Synchronous</Synchronization>
+    <Type>10002</Type>
+    <SequenceNumber>1001</SequenceNumber>
+    <Url/>
+    <Assembly>Microsoft.Office.DocumentManagement, Version=16.0.0.0, Culture=neutral, PublicKeyToken=71e9bce111e9429c</Assembly>
+    <Class>Microsoft.Office.DocumentManagement.Internal.DocIdHandler</Class>
+    <Data/>
+    <Filter/>
+  </Receiver>
+  <Receiver>
+    <Name>Document ID Generator</Name>
+    <Synchronization>Synchronous</Synchronization>
+    <Type>10004</Type>
+    <SequenceNumber>1002</SequenceNumber>
+    <Url/>
+    <Assembly>Microsoft.Office.DocumentManagement, Version=16.0.0.0, Culture=neutral, PublicKeyToken=71e9bce111e9429c</Assembly>
+    <Class>Microsoft.Office.DocumentManagement.Internal.DocIdHandler</Class>
+    <Data/>
+    <Filter/>
+  </Receiver>
+  <Receiver>
+    <Name>Document ID Generator</Name>
+    <Synchronization>Synchronous</Synchronization>
+    <Type>10006</Type>
+    <SequenceNumber>1003</SequenceNumber>
+    <Url/>
+    <Assembly>Microsoft.Office.DocumentManagement, Version=16.0.0.0, Culture=neutral, PublicKeyToken=71e9bce111e9429c</Assembly>
+    <Class>Microsoft.Office.DocumentManagement.Internal.DocIdHandler</Class>
+    <Data/>
+    <Filter/>
+  </Receiver>
+</spe:Receivers>
+</file>
+
+<file path=customXml/item4.xml><?xml version="1.0" encoding="utf-8"?>
 <ct:contentTypeSchema xmlns:ct="http://schemas.microsoft.com/office/2006/metadata/contentType" xmlns:ma="http://schemas.microsoft.com/office/2006/metadata/properties/metaAttributes" ct:_="" ma:_="" ma:contentTypeName="Document" ma:contentTypeID="0x01010020672D93D3EF3B4CB65A92FAF60F9AF2" ma:contentTypeVersion="1" ma:contentTypeDescription="Crée un document." ma:contentTypeScope="" ma:versionID="5340ecf22783b7eb65f0a3394e1ae9ab">
   <xsd:schema xmlns:xsd="http://www.w3.org/2001/XMLSchema" xmlns:xs="http://www.w3.org/2001/XMLSchema" xmlns:p="http://schemas.microsoft.com/office/2006/metadata/properties" xmlns:ns2="23337013-54cb-4768-9b3c-c163b11c772f" targetNamespace="http://schemas.microsoft.com/office/2006/metadata/properties" ma:root="true" ma:fieldsID="2c316ac489632711b00137addbec8f4c" ns2:_="">
     <xsd:import namespace="23337013-54cb-4768-9b3c-c163b11c772f"/>
@@ -22172,65 +23280,7 @@
 </ct:contentTypeSchema>
 </file>
 
-<file path=customXml/item4.xml><?xml version="1.0" encoding="utf-8"?>
-<?mso-contentType ?>
-<spe:Receivers xmlns:spe="http://schemas.microsoft.com/sharepoint/events">
-  <Receiver>
-    <Name>Document ID Generator</Name>
-    <Synchronization>Synchronous</Synchronization>
-    <Type>10001</Type>
-    <SequenceNumber>1000</SequenceNumber>
-    <Url/>
-    <Assembly>Microsoft.Office.DocumentManagement, Version=16.0.0.0, Culture=neutral, PublicKeyToken=71e9bce111e9429c</Assembly>
-    <Class>Microsoft.Office.DocumentManagement.Internal.DocIdHandler</Class>
-    <Data/>
-    <Filter/>
-  </Receiver>
-  <Receiver>
-    <Name>Document ID Generator</Name>
-    <Synchronization>Synchronous</Synchronization>
-    <Type>10002</Type>
-    <SequenceNumber>1001</SequenceNumber>
-    <Url/>
-    <Assembly>Microsoft.Office.DocumentManagement, Version=16.0.0.0, Culture=neutral, PublicKeyToken=71e9bce111e9429c</Assembly>
-    <Class>Microsoft.Office.DocumentManagement.Internal.DocIdHandler</Class>
-    <Data/>
-    <Filter/>
-  </Receiver>
-  <Receiver>
-    <Name>Document ID Generator</Name>
-    <Synchronization>Synchronous</Synchronization>
-    <Type>10004</Type>
-    <SequenceNumber>1002</SequenceNumber>
-    <Url/>
-    <Assembly>Microsoft.Office.DocumentManagement, Version=16.0.0.0, Culture=neutral, PublicKeyToken=71e9bce111e9429c</Assembly>
-    <Class>Microsoft.Office.DocumentManagement.Internal.DocIdHandler</Class>
-    <Data/>
-    <Filter/>
-  </Receiver>
-  <Receiver>
-    <Name>Document ID Generator</Name>
-    <Synchronization>Synchronous</Synchronization>
-    <Type>10006</Type>
-    <SequenceNumber>1003</SequenceNumber>
-    <Url/>
-    <Assembly>Microsoft.Office.DocumentManagement, Version=16.0.0.0, Culture=neutral, PublicKeyToken=71e9bce111e9429c</Assembly>
-    <Class>Microsoft.Office.DocumentManagement.Internal.DocIdHandler</Class>
-    <Data/>
-    <Filter/>
-  </Receiver>
-</spe:Receivers>
-</file>
-
 <file path=customXml/itemProps1.xml><?xml version="1.0" encoding="utf-8"?>
-<ds:datastoreItem xmlns:ds="http://schemas.openxmlformats.org/officeDocument/2006/customXml" ds:itemID="{CC73938A-314D-43D8-BD7D-AD527C884CC9}">
-  <ds:schemaRefs>
-    <ds:schemaRef ds:uri="http://schemas.microsoft.com/sharepoint/v3/contenttype/forms"/>
-  </ds:schemaRefs>
-</ds:datastoreItem>
-</file>
-
-<file path=customXml/itemProps2.xml><?xml version="1.0" encoding="utf-8"?>
 <ds:datastoreItem xmlns:ds="http://schemas.openxmlformats.org/officeDocument/2006/customXml" ds:itemID="{DDA6D6D7-2D09-42BE-B585-1E55D9857EDE}">
   <ds:schemaRefs>
     <ds:schemaRef ds:uri="http://purl.org/dc/terms/"/>
@@ -22246,7 +23296,23 @@
 </ds:datastoreItem>
 </file>
 
+<file path=customXml/itemProps2.xml><?xml version="1.0" encoding="utf-8"?>
+<ds:datastoreItem xmlns:ds="http://schemas.openxmlformats.org/officeDocument/2006/customXml" ds:itemID="{CC73938A-314D-43D8-BD7D-AD527C884CC9}">
+  <ds:schemaRefs>
+    <ds:schemaRef ds:uri="http://schemas.microsoft.com/sharepoint/v3/contenttype/forms"/>
+  </ds:schemaRefs>
+</ds:datastoreItem>
+</file>
+
 <file path=customXml/itemProps3.xml><?xml version="1.0" encoding="utf-8"?>
+<ds:datastoreItem xmlns:ds="http://schemas.openxmlformats.org/officeDocument/2006/customXml" ds:itemID="{121CC712-19DF-4ADD-855F-F13D8EF9501F}">
+  <ds:schemaRefs>
+    <ds:schemaRef ds:uri="http://schemas.microsoft.com/sharepoint/events"/>
+  </ds:schemaRefs>
+</ds:datastoreItem>
+</file>
+
+<file path=customXml/itemProps4.xml><?xml version="1.0" encoding="utf-8"?>
 <ds:datastoreItem xmlns:ds="http://schemas.openxmlformats.org/officeDocument/2006/customXml" ds:itemID="{04792738-F077-451B-9724-11E76DB52A2E}">
   <ds:schemaRefs>
     <ds:schemaRef ds:uri="http://schemas.microsoft.com/office/2006/metadata/contentType"/>
@@ -22262,12 +23328,4 @@
     <ds:schemaRef ds:uri="http://schemas.microsoft.com/internal/obd"/>
   </ds:schemaRefs>
 </ds:datastoreItem>
-</file>
-
-<file path=customXml/itemProps4.xml><?xml version="1.0" encoding="utf-8"?>
-<ds:datastoreItem xmlns:ds="http://schemas.openxmlformats.org/officeDocument/2006/customXml" ds:itemID="{121CC712-19DF-4ADD-855F-F13D8EF9501F}">
-  <ds:schemaRefs>
-    <ds:schemaRef ds:uri="http://schemas.microsoft.com/sharepoint/events"/>
-  </ds:schemaRefs>
-</ds:datastoreItem>
 </file>
</xml_diff>